<commit_message>
small updates to PwPt
</commit_message>
<xml_diff>
--- a/Hammerhead Tron AI.pptx
+++ b/Hammerhead Tron AI.pptx
@@ -2,7 +2,7 @@
 <file path=ppt/presentation.xml><?xml version="1.0" encoding="utf-8"?>
 <p:presentation xmlns:a="http://schemas.openxmlformats.org/drawingml/2006/main" xmlns:r="http://schemas.openxmlformats.org/officeDocument/2006/relationships" xmlns:p="http://schemas.openxmlformats.org/presentationml/2006/main" saveSubsetFonts="1">
   <p:sldMasterIdLst>
-    <p:sldMasterId id="2147483648" r:id="rId1"/>
+    <p:sldMasterId id="2147483798" r:id="rId1"/>
   </p:sldMasterIdLst>
   <p:sldIdLst>
     <p:sldId id="256" r:id="rId2"/>
@@ -11,7 +11,8 @@
     <p:sldId id="259" r:id="rId5"/>
     <p:sldId id="260" r:id="rId6"/>
     <p:sldId id="261" r:id="rId7"/>
-    <p:sldId id="262" r:id="rId8"/>
+    <p:sldId id="263" r:id="rId8"/>
+    <p:sldId id="262" r:id="rId9"/>
   </p:sldIdLst>
   <p:sldSz cx="9144000" cy="6858000" type="screen4x3"/>
   <p:notesSz cx="6858000" cy="9144000"/>
@@ -110,6 +111,22 @@
       </a:defRPr>
     </a:lvl9pPr>
   </p:defaultTextStyle>
+  <p:extLst>
+    <p:ext uri="{EFAFB233-063F-42B5-8137-9DF3F51BA10A}">
+      <p15:sldGuideLst xmlns:p15="http://schemas.microsoft.com/office/powerpoint/2012/main">
+        <p15:guide id="1" orient="horz" pos="2160">
+          <p15:clr>
+            <a:srgbClr val="A4A3A4"/>
+          </p15:clr>
+        </p15:guide>
+        <p15:guide id="2" pos="2880">
+          <p15:clr>
+            <a:srgbClr val="A4A3A4"/>
+          </p15:clr>
+        </p15:guide>
+      </p15:sldGuideLst>
+    </p:ext>
+  </p:extLst>
 </p:presentation>
 </file>
 
@@ -132,6 +149,110 @@
       </p:grpSpPr>
       <p:sp>
         <p:nvSpPr>
+          <p:cNvPr id="11" name="Freeform 6"/>
+          <p:cNvSpPr/>
+          <p:nvPr/>
+        </p:nvSpPr>
+        <p:spPr bwMode="auto">
+          <a:xfrm>
+            <a:off x="0" y="-3175"/>
+            <a:ext cx="9144000" cy="5203825"/>
+          </a:xfrm>
+          <a:custGeom>
+            <a:avLst/>
+            <a:gdLst/>
+            <a:ahLst/>
+            <a:cxnLst/>
+            <a:rect l="0" t="0" r="r" b="b"/>
+            <a:pathLst>
+              <a:path w="5760" h="3278">
+                <a:moveTo>
+                  <a:pt x="5760" y="0"/>
+                </a:moveTo>
+                <a:lnTo>
+                  <a:pt x="0" y="0"/>
+                </a:lnTo>
+                <a:lnTo>
+                  <a:pt x="0" y="3090"/>
+                </a:lnTo>
+                <a:lnTo>
+                  <a:pt x="943" y="3090"/>
+                </a:lnTo>
+                <a:lnTo>
+                  <a:pt x="1123" y="3270"/>
+                </a:lnTo>
+                <a:lnTo>
+                  <a:pt x="1123" y="3270"/>
+                </a:lnTo>
+                <a:lnTo>
+                  <a:pt x="1127" y="3272"/>
+                </a:lnTo>
+                <a:lnTo>
+                  <a:pt x="1133" y="3275"/>
+                </a:lnTo>
+                <a:lnTo>
+                  <a:pt x="1139" y="3278"/>
+                </a:lnTo>
+                <a:lnTo>
+                  <a:pt x="1144" y="3278"/>
+                </a:lnTo>
+                <a:lnTo>
+                  <a:pt x="1150" y="3278"/>
+                </a:lnTo>
+                <a:lnTo>
+                  <a:pt x="1155" y="3275"/>
+                </a:lnTo>
+                <a:lnTo>
+                  <a:pt x="1161" y="3272"/>
+                </a:lnTo>
+                <a:lnTo>
+                  <a:pt x="1165" y="3270"/>
+                </a:lnTo>
+                <a:lnTo>
+                  <a:pt x="1345" y="3090"/>
+                </a:lnTo>
+                <a:lnTo>
+                  <a:pt x="5760" y="3090"/>
+                </a:lnTo>
+                <a:lnTo>
+                  <a:pt x="5760" y="0"/>
+                </a:lnTo>
+                <a:close/>
+              </a:path>
+            </a:pathLst>
+          </a:custGeom>
+          <a:ln/>
+          <a:effectLst/>
+          <a:extLst>
+            <a:ext uri="{91240B29-F687-4F45-9708-019B960494DF}">
+              <a14:hiddenLine xmlns:a14="http://schemas.microsoft.com/office/drawing/2010/main" w="9525">
+                <a:solidFill>
+                  <a:srgbClr val="000000"/>
+                </a:solidFill>
+                <a:round/>
+                <a:headEnd/>
+                <a:tailEnd/>
+              </a14:hiddenLine>
+            </a:ext>
+          </a:extLst>
+        </p:spPr>
+        <p:style>
+          <a:lnRef idx="1">
+            <a:schemeClr val="accent1"/>
+          </a:lnRef>
+          <a:fillRef idx="3">
+            <a:schemeClr val="accent1"/>
+          </a:fillRef>
+          <a:effectRef idx="2">
+            <a:schemeClr val="accent1"/>
+          </a:effectRef>
+          <a:fontRef idx="minor">
+            <a:schemeClr val="lt1"/>
+          </a:fontRef>
+        </p:style>
+      </p:sp>
+      <p:sp>
+        <p:nvSpPr>
           <p:cNvPr id="2" name="Title 1"/>
           <p:cNvSpPr>
             <a:spLocks noGrp="1"/>
@@ -142,19 +263,23 @@
         </p:nvSpPr>
         <p:spPr>
           <a:xfrm>
-            <a:off x="685800" y="2130425"/>
-            <a:ext cx="7772400" cy="1470025"/>
+            <a:off x="808831" y="1449146"/>
+            <a:ext cx="7526338" cy="2971051"/>
           </a:xfrm>
         </p:spPr>
         <p:txBody>
           <a:bodyPr/>
-          <a:lstStyle/>
+          <a:lstStyle>
+            <a:lvl1pPr>
+              <a:defRPr sz="5400"/>
+            </a:lvl1pPr>
+          </a:lstStyle>
           <a:p>
             <a:r>
               <a:rPr lang="en-US" smtClean="0"/>
               <a:t>Click to edit Master title style</a:t>
             </a:r>
-            <a:endParaRPr lang="en-US"/>
+            <a:endParaRPr lang="en-US" dirty="0"/>
           </a:p>
         </p:txBody>
       </p:sp>
@@ -170,20 +295,18 @@
         </p:nvSpPr>
         <p:spPr>
           <a:xfrm>
-            <a:off x="1371600" y="3886200"/>
-            <a:ext cx="6400800" cy="1752600"/>
+            <a:off x="808831" y="5280847"/>
+            <a:ext cx="7526338" cy="434974"/>
           </a:xfrm>
         </p:spPr>
         <p:txBody>
-          <a:bodyPr/>
+          <a:bodyPr anchor="t"/>
           <a:lstStyle>
-            <a:lvl1pPr marL="0" indent="0" algn="ctr">
+            <a:lvl1pPr marL="0" indent="0" algn="l">
               <a:buNone/>
               <a:defRPr>
                 <a:solidFill>
-                  <a:schemeClr val="tx1">
-                    <a:tint val="75000"/>
-                  </a:schemeClr>
+                  <a:schemeClr val="tx1"/>
                 </a:solidFill>
               </a:defRPr>
             </a:lvl1pPr>
@@ -273,7 +396,7 @@
               <a:rPr lang="en-US" smtClean="0"/>
               <a:t>Click to edit Master subtitle style</a:t>
             </a:r>
-            <a:endParaRPr lang="en-US"/>
+            <a:endParaRPr lang="en-US" dirty="0"/>
           </a:p>
         </p:txBody>
       </p:sp>
@@ -345,7 +468,7 @@
     </p:spTree>
     <p:extLst>
       <p:ext uri="{BB962C8B-B14F-4D97-AF65-F5344CB8AC3E}">
-        <p14:creationId xmlns:p14="http://schemas.microsoft.com/office/powerpoint/2010/main" val="1864163434"/>
+        <p14:creationId xmlns:p14="http://schemas.microsoft.com/office/powerpoint/2010/main" val="751550894"/>
       </p:ext>
     </p:extLst>
   </p:cSld>
@@ -356,6 +479,1181 @@
 </file>
 
 <file path=ppt/slideLayouts/slideLayout10.xml><?xml version="1.0" encoding="utf-8"?>
+<p:sldLayout xmlns:a="http://schemas.openxmlformats.org/drawingml/2006/main" xmlns:r="http://schemas.openxmlformats.org/officeDocument/2006/relationships" xmlns:p="http://schemas.openxmlformats.org/presentationml/2006/main" preserve="1">
+  <p:cSld name="Panoramic Picture with Caption">
+    <p:spTree>
+      <p:nvGrpSpPr>
+        <p:cNvPr id="1" name=""/>
+        <p:cNvGrpSpPr/>
+        <p:nvPr/>
+      </p:nvGrpSpPr>
+      <p:grpSpPr>
+        <a:xfrm>
+          <a:off x="0" y="0"/>
+          <a:ext cx="0" cy="0"/>
+          <a:chOff x="0" y="0"/>
+          <a:chExt cx="0" cy="0"/>
+        </a:xfrm>
+      </p:grpSpPr>
+      <p:sp>
+        <p:nvSpPr>
+          <p:cNvPr id="2" name="Title 1"/>
+          <p:cNvSpPr>
+            <a:spLocks noGrp="1"/>
+          </p:cNvSpPr>
+          <p:nvPr>
+            <p:ph type="title"/>
+          </p:nvPr>
+        </p:nvSpPr>
+        <p:spPr>
+          <a:xfrm>
+            <a:off x="804863" y="4800600"/>
+            <a:ext cx="7526337" cy="566738"/>
+          </a:xfrm>
+        </p:spPr>
+        <p:txBody>
+          <a:bodyPr anchor="b">
+            <a:normAutofit/>
+          </a:bodyPr>
+          <a:lstStyle>
+            <a:lvl1pPr algn="l">
+              <a:defRPr sz="2400" b="0"/>
+            </a:lvl1pPr>
+          </a:lstStyle>
+          <a:p>
+            <a:r>
+              <a:rPr lang="en-US" smtClean="0"/>
+              <a:t>Click to edit Master title style</a:t>
+            </a:r>
+            <a:endParaRPr lang="en-US" dirty="0"/>
+          </a:p>
+        </p:txBody>
+      </p:sp>
+      <p:sp>
+        <p:nvSpPr>
+          <p:cNvPr id="15" name="Picture Placeholder 14"/>
+          <p:cNvSpPr>
+            <a:spLocks noGrp="1" noChangeAspect="1"/>
+          </p:cNvSpPr>
+          <p:nvPr>
+            <p:ph type="pic" sz="quarter" idx="13"/>
+          </p:nvPr>
+        </p:nvSpPr>
+        <p:spPr bwMode="auto">
+          <a:xfrm>
+            <a:off x="0" y="0"/>
+            <a:ext cx="9144000" cy="4800600"/>
+          </a:xfrm>
+          <a:custGeom>
+            <a:avLst/>
+            <a:gdLst/>
+            <a:ahLst/>
+            <a:cxnLst/>
+            <a:rect l="0" t="0" r="r" b="b"/>
+            <a:pathLst>
+              <a:path w="5760" h="3289">
+                <a:moveTo>
+                  <a:pt x="5760" y="0"/>
+                </a:moveTo>
+                <a:lnTo>
+                  <a:pt x="0" y="0"/>
+                </a:lnTo>
+                <a:lnTo>
+                  <a:pt x="0" y="3100"/>
+                </a:lnTo>
+                <a:lnTo>
+                  <a:pt x="943" y="3100"/>
+                </a:lnTo>
+                <a:lnTo>
+                  <a:pt x="1123" y="3281"/>
+                </a:lnTo>
+                <a:lnTo>
+                  <a:pt x="1123" y="3281"/>
+                </a:lnTo>
+                <a:lnTo>
+                  <a:pt x="1127" y="3283"/>
+                </a:lnTo>
+                <a:lnTo>
+                  <a:pt x="1133" y="3286"/>
+                </a:lnTo>
+                <a:lnTo>
+                  <a:pt x="1139" y="3289"/>
+                </a:lnTo>
+                <a:lnTo>
+                  <a:pt x="1144" y="3289"/>
+                </a:lnTo>
+                <a:lnTo>
+                  <a:pt x="1150" y="3289"/>
+                </a:lnTo>
+                <a:lnTo>
+                  <a:pt x="1155" y="3286"/>
+                </a:lnTo>
+                <a:lnTo>
+                  <a:pt x="1161" y="3283"/>
+                </a:lnTo>
+                <a:lnTo>
+                  <a:pt x="1165" y="3281"/>
+                </a:lnTo>
+                <a:lnTo>
+                  <a:pt x="1345" y="3100"/>
+                </a:lnTo>
+                <a:lnTo>
+                  <a:pt x="5760" y="3100"/>
+                </a:lnTo>
+                <a:lnTo>
+                  <a:pt x="5760" y="0"/>
+                </a:lnTo>
+                <a:close/>
+              </a:path>
+            </a:pathLst>
+          </a:custGeom>
+          <a:noFill/>
+          <a:ln>
+            <a:solidFill>
+              <a:schemeClr val="tx2"/>
+            </a:solidFill>
+          </a:ln>
+        </p:spPr>
+        <p:style>
+          <a:lnRef idx="1">
+            <a:schemeClr val="accent1"/>
+          </a:lnRef>
+          <a:fillRef idx="3">
+            <a:schemeClr val="accent1"/>
+          </a:fillRef>
+          <a:effectRef idx="2">
+            <a:schemeClr val="accent1"/>
+          </a:effectRef>
+          <a:fontRef idx="minor">
+            <a:schemeClr val="lt1"/>
+          </a:fontRef>
+        </p:style>
+        <p:txBody>
+          <a:bodyPr wrap="square" numCol="1" anchor="t" anchorCtr="0" compatLnSpc="1">
+            <a:prstTxWarp prst="textNoShape">
+              <a:avLst/>
+            </a:prstTxWarp>
+            <a:normAutofit/>
+          </a:bodyPr>
+          <a:lstStyle>
+            <a:lvl1pPr marL="0" indent="0" algn="ctr">
+              <a:buFontTx/>
+              <a:buNone/>
+              <a:defRPr sz="1600"/>
+            </a:lvl1pPr>
+          </a:lstStyle>
+          <a:p>
+            <a:r>
+              <a:rPr lang="en-US" smtClean="0"/>
+              <a:t>Click icon to add picture</a:t>
+            </a:r>
+            <a:endParaRPr lang="en-US" dirty="0"/>
+          </a:p>
+        </p:txBody>
+      </p:sp>
+      <p:sp>
+        <p:nvSpPr>
+          <p:cNvPr id="4" name="Text Placeholder 3"/>
+          <p:cNvSpPr>
+            <a:spLocks noGrp="1"/>
+          </p:cNvSpPr>
+          <p:nvPr>
+            <p:ph type="body" sz="half" idx="2"/>
+          </p:nvPr>
+        </p:nvSpPr>
+        <p:spPr>
+          <a:xfrm>
+            <a:off x="804863" y="5367338"/>
+            <a:ext cx="7526337" cy="493712"/>
+          </a:xfrm>
+        </p:spPr>
+        <p:txBody>
+          <a:bodyPr>
+            <a:normAutofit/>
+          </a:bodyPr>
+          <a:lstStyle>
+            <a:lvl1pPr marL="0" indent="0">
+              <a:buNone/>
+              <a:defRPr sz="1200"/>
+            </a:lvl1pPr>
+            <a:lvl2pPr marL="457200" indent="0">
+              <a:buNone/>
+              <a:defRPr sz="1200"/>
+            </a:lvl2pPr>
+            <a:lvl3pPr marL="914400" indent="0">
+              <a:buNone/>
+              <a:defRPr sz="1000"/>
+            </a:lvl3pPr>
+            <a:lvl4pPr marL="1371600" indent="0">
+              <a:buNone/>
+              <a:defRPr sz="900"/>
+            </a:lvl4pPr>
+            <a:lvl5pPr marL="1828800" indent="0">
+              <a:buNone/>
+              <a:defRPr sz="900"/>
+            </a:lvl5pPr>
+            <a:lvl6pPr marL="2286000" indent="0">
+              <a:buNone/>
+              <a:defRPr sz="900"/>
+            </a:lvl6pPr>
+            <a:lvl7pPr marL="2743200" indent="0">
+              <a:buNone/>
+              <a:defRPr sz="900"/>
+            </a:lvl7pPr>
+            <a:lvl8pPr marL="3200400" indent="0">
+              <a:buNone/>
+              <a:defRPr sz="900"/>
+            </a:lvl8pPr>
+            <a:lvl9pPr marL="3657600" indent="0">
+              <a:buNone/>
+              <a:defRPr sz="900"/>
+            </a:lvl9pPr>
+          </a:lstStyle>
+          <a:p>
+            <a:pPr lvl="0"/>
+            <a:r>
+              <a:rPr lang="en-US" smtClean="0"/>
+              <a:t>Click to edit Master text styles</a:t>
+            </a:r>
+          </a:p>
+        </p:txBody>
+      </p:sp>
+      <p:sp>
+        <p:nvSpPr>
+          <p:cNvPr id="5" name="Date Placeholder 4"/>
+          <p:cNvSpPr>
+            <a:spLocks noGrp="1"/>
+          </p:cNvSpPr>
+          <p:nvPr>
+            <p:ph type="dt" sz="half" idx="10"/>
+          </p:nvPr>
+        </p:nvSpPr>
+        <p:spPr/>
+        <p:txBody>
+          <a:bodyPr/>
+          <a:lstStyle/>
+          <a:p>
+            <a:fld id="{A0EB2B84-A710-4304-A084-3986FE04F79C}" type="datetimeFigureOut">
+              <a:rPr lang="en-US" smtClean="0"/>
+              <a:t>12/9/2015</a:t>
+            </a:fld>
+            <a:endParaRPr lang="en-US"/>
+          </a:p>
+        </p:txBody>
+      </p:sp>
+      <p:sp>
+        <p:nvSpPr>
+          <p:cNvPr id="6" name="Footer Placeholder 5"/>
+          <p:cNvSpPr>
+            <a:spLocks noGrp="1"/>
+          </p:cNvSpPr>
+          <p:nvPr>
+            <p:ph type="ftr" sz="quarter" idx="11"/>
+          </p:nvPr>
+        </p:nvSpPr>
+        <p:spPr/>
+        <p:txBody>
+          <a:bodyPr/>
+          <a:lstStyle/>
+          <a:p>
+            <a:endParaRPr lang="en-US"/>
+          </a:p>
+        </p:txBody>
+      </p:sp>
+      <p:sp>
+        <p:nvSpPr>
+          <p:cNvPr id="7" name="Slide Number Placeholder 6"/>
+          <p:cNvSpPr>
+            <a:spLocks noGrp="1"/>
+          </p:cNvSpPr>
+          <p:nvPr>
+            <p:ph type="sldNum" sz="quarter" idx="12"/>
+          </p:nvPr>
+        </p:nvSpPr>
+        <p:spPr/>
+        <p:txBody>
+          <a:bodyPr/>
+          <a:lstStyle/>
+          <a:p>
+            <a:fld id="{484A773A-47B9-4117-9E98-033583F0143E}" type="slidenum">
+              <a:rPr lang="en-US" smtClean="0"/>
+              <a:t>‹#›</a:t>
+            </a:fld>
+            <a:endParaRPr lang="en-US"/>
+          </a:p>
+        </p:txBody>
+      </p:sp>
+    </p:spTree>
+    <p:extLst>
+      <p:ext uri="{BB962C8B-B14F-4D97-AF65-F5344CB8AC3E}">
+        <p14:creationId xmlns:p14="http://schemas.microsoft.com/office/powerpoint/2010/main" val="1688794787"/>
+      </p:ext>
+    </p:extLst>
+  </p:cSld>
+  <p:clrMapOvr>
+    <a:masterClrMapping/>
+  </p:clrMapOvr>
+</p:sldLayout>
+</file>
+
+<file path=ppt/slideLayouts/slideLayout11.xml><?xml version="1.0" encoding="utf-8"?>
+<p:sldLayout xmlns:a="http://schemas.openxmlformats.org/drawingml/2006/main" xmlns:r="http://schemas.openxmlformats.org/officeDocument/2006/relationships" xmlns:p="http://schemas.openxmlformats.org/presentationml/2006/main" preserve="1">
+  <p:cSld name="Quote with Caption">
+    <p:spTree>
+      <p:nvGrpSpPr>
+        <p:cNvPr id="1" name=""/>
+        <p:cNvGrpSpPr/>
+        <p:nvPr/>
+      </p:nvGrpSpPr>
+      <p:grpSpPr>
+        <a:xfrm>
+          <a:off x="0" y="0"/>
+          <a:ext cx="0" cy="0"/>
+          <a:chOff x="0" y="0"/>
+          <a:chExt cx="0" cy="0"/>
+        </a:xfrm>
+      </p:grpSpPr>
+      <p:sp>
+        <p:nvSpPr>
+          <p:cNvPr id="8" name="Freeform 6"/>
+          <p:cNvSpPr>
+            <a:spLocks noChangeAspect="1"/>
+          </p:cNvSpPr>
+          <p:nvPr/>
+        </p:nvSpPr>
+        <p:spPr bwMode="auto">
+          <a:xfrm>
+            <a:off x="485107" y="1338479"/>
+            <a:ext cx="4749312" cy="3239188"/>
+          </a:xfrm>
+          <a:custGeom>
+            <a:avLst/>
+            <a:gdLst/>
+            <a:ahLst/>
+            <a:cxnLst/>
+            <a:rect l="0" t="0" r="r" b="b"/>
+            <a:pathLst>
+              <a:path w="3384" h="2308">
+                <a:moveTo>
+                  <a:pt x="3340" y="0"/>
+                </a:moveTo>
+                <a:lnTo>
+                  <a:pt x="44" y="0"/>
+                </a:lnTo>
+                <a:lnTo>
+                  <a:pt x="44" y="0"/>
+                </a:lnTo>
+                <a:lnTo>
+                  <a:pt x="34" y="0"/>
+                </a:lnTo>
+                <a:lnTo>
+                  <a:pt x="26" y="4"/>
+                </a:lnTo>
+                <a:lnTo>
+                  <a:pt x="20" y="8"/>
+                </a:lnTo>
+                <a:lnTo>
+                  <a:pt x="12" y="12"/>
+                </a:lnTo>
+                <a:lnTo>
+                  <a:pt x="8" y="20"/>
+                </a:lnTo>
+                <a:lnTo>
+                  <a:pt x="4" y="26"/>
+                </a:lnTo>
+                <a:lnTo>
+                  <a:pt x="0" y="34"/>
+                </a:lnTo>
+                <a:lnTo>
+                  <a:pt x="0" y="44"/>
+                </a:lnTo>
+                <a:lnTo>
+                  <a:pt x="0" y="2076"/>
+                </a:lnTo>
+                <a:lnTo>
+                  <a:pt x="0" y="2076"/>
+                </a:lnTo>
+                <a:lnTo>
+                  <a:pt x="0" y="2086"/>
+                </a:lnTo>
+                <a:lnTo>
+                  <a:pt x="4" y="2094"/>
+                </a:lnTo>
+                <a:lnTo>
+                  <a:pt x="8" y="2100"/>
+                </a:lnTo>
+                <a:lnTo>
+                  <a:pt x="12" y="2108"/>
+                </a:lnTo>
+                <a:lnTo>
+                  <a:pt x="20" y="2112"/>
+                </a:lnTo>
+                <a:lnTo>
+                  <a:pt x="26" y="2116"/>
+                </a:lnTo>
+                <a:lnTo>
+                  <a:pt x="34" y="2120"/>
+                </a:lnTo>
+                <a:lnTo>
+                  <a:pt x="44" y="2120"/>
+                </a:lnTo>
+                <a:lnTo>
+                  <a:pt x="474" y="2120"/>
+                </a:lnTo>
+                <a:lnTo>
+                  <a:pt x="650" y="2296"/>
+                </a:lnTo>
+                <a:lnTo>
+                  <a:pt x="650" y="2296"/>
+                </a:lnTo>
+                <a:lnTo>
+                  <a:pt x="656" y="2300"/>
+                </a:lnTo>
+                <a:lnTo>
+                  <a:pt x="664" y="2304"/>
+                </a:lnTo>
+                <a:lnTo>
+                  <a:pt x="672" y="2308"/>
+                </a:lnTo>
+                <a:lnTo>
+                  <a:pt x="680" y="2308"/>
+                </a:lnTo>
+                <a:lnTo>
+                  <a:pt x="688" y="2308"/>
+                </a:lnTo>
+                <a:lnTo>
+                  <a:pt x="696" y="2304"/>
+                </a:lnTo>
+                <a:lnTo>
+                  <a:pt x="704" y="2300"/>
+                </a:lnTo>
+                <a:lnTo>
+                  <a:pt x="710" y="2296"/>
+                </a:lnTo>
+                <a:lnTo>
+                  <a:pt x="886" y="2120"/>
+                </a:lnTo>
+                <a:lnTo>
+                  <a:pt x="3340" y="2120"/>
+                </a:lnTo>
+                <a:lnTo>
+                  <a:pt x="3340" y="2120"/>
+                </a:lnTo>
+                <a:lnTo>
+                  <a:pt x="3350" y="2120"/>
+                </a:lnTo>
+                <a:lnTo>
+                  <a:pt x="3358" y="2116"/>
+                </a:lnTo>
+                <a:lnTo>
+                  <a:pt x="3364" y="2112"/>
+                </a:lnTo>
+                <a:lnTo>
+                  <a:pt x="3372" y="2108"/>
+                </a:lnTo>
+                <a:lnTo>
+                  <a:pt x="3376" y="2100"/>
+                </a:lnTo>
+                <a:lnTo>
+                  <a:pt x="3380" y="2094"/>
+                </a:lnTo>
+                <a:lnTo>
+                  <a:pt x="3384" y="2086"/>
+                </a:lnTo>
+                <a:lnTo>
+                  <a:pt x="3384" y="2076"/>
+                </a:lnTo>
+                <a:lnTo>
+                  <a:pt x="3384" y="44"/>
+                </a:lnTo>
+                <a:lnTo>
+                  <a:pt x="3384" y="44"/>
+                </a:lnTo>
+                <a:lnTo>
+                  <a:pt x="3384" y="34"/>
+                </a:lnTo>
+                <a:lnTo>
+                  <a:pt x="3380" y="26"/>
+                </a:lnTo>
+                <a:lnTo>
+                  <a:pt x="3376" y="20"/>
+                </a:lnTo>
+                <a:lnTo>
+                  <a:pt x="3372" y="12"/>
+                </a:lnTo>
+                <a:lnTo>
+                  <a:pt x="3364" y="8"/>
+                </a:lnTo>
+                <a:lnTo>
+                  <a:pt x="3358" y="4"/>
+                </a:lnTo>
+                <a:lnTo>
+                  <a:pt x="3350" y="0"/>
+                </a:lnTo>
+                <a:lnTo>
+                  <a:pt x="3340" y="0"/>
+                </a:lnTo>
+                <a:lnTo>
+                  <a:pt x="3340" y="0"/>
+                </a:lnTo>
+                <a:close/>
+              </a:path>
+            </a:pathLst>
+          </a:custGeom>
+          <a:ln>
+            <a:solidFill>
+              <a:schemeClr val="accent1"/>
+            </a:solidFill>
+          </a:ln>
+        </p:spPr>
+        <p:style>
+          <a:lnRef idx="1">
+            <a:schemeClr val="accent1"/>
+          </a:lnRef>
+          <a:fillRef idx="3">
+            <a:schemeClr val="accent1"/>
+          </a:fillRef>
+          <a:effectRef idx="2">
+            <a:schemeClr val="accent1"/>
+          </a:effectRef>
+          <a:fontRef idx="minor">
+            <a:schemeClr val="lt1"/>
+          </a:fontRef>
+        </p:style>
+      </p:sp>
+      <p:sp>
+        <p:nvSpPr>
+          <p:cNvPr id="2" name="Title 1"/>
+          <p:cNvSpPr>
+            <a:spLocks noGrp="1"/>
+          </p:cNvSpPr>
+          <p:nvPr>
+            <p:ph type="title"/>
+          </p:nvPr>
+        </p:nvSpPr>
+        <p:spPr>
+          <a:xfrm>
+            <a:off x="649573" y="1495525"/>
+            <a:ext cx="4420380" cy="2645912"/>
+          </a:xfrm>
+        </p:spPr>
+        <p:txBody>
+          <a:bodyPr anchor="b"/>
+          <a:lstStyle>
+            <a:lvl1pPr algn="l">
+              <a:defRPr sz="4200" b="1" cap="none"/>
+            </a:lvl1pPr>
+          </a:lstStyle>
+          <a:p>
+            <a:r>
+              <a:rPr lang="en-US" smtClean="0"/>
+              <a:t>Click to edit Master title style</a:t>
+            </a:r>
+            <a:endParaRPr lang="en-US" dirty="0"/>
+          </a:p>
+        </p:txBody>
+      </p:sp>
+      <p:sp>
+        <p:nvSpPr>
+          <p:cNvPr id="3" name="Text Placeholder 2"/>
+          <p:cNvSpPr>
+            <a:spLocks noGrp="1"/>
+          </p:cNvSpPr>
+          <p:nvPr>
+            <p:ph type="body" idx="1"/>
+          </p:nvPr>
+        </p:nvSpPr>
+        <p:spPr>
+          <a:xfrm>
+            <a:off x="651226" y="4700702"/>
+            <a:ext cx="4418727" cy="713241"/>
+          </a:xfrm>
+        </p:spPr>
+        <p:txBody>
+          <a:bodyPr anchor="t">
+            <a:noAutofit/>
+          </a:bodyPr>
+          <a:lstStyle>
+            <a:lvl1pPr marL="0" indent="0" algn="l">
+              <a:buNone/>
+              <a:defRPr sz="1800">
+                <a:solidFill>
+                  <a:schemeClr val="tx1"/>
+                </a:solidFill>
+              </a:defRPr>
+            </a:lvl1pPr>
+            <a:lvl2pPr marL="457200" indent="0">
+              <a:buNone/>
+              <a:defRPr sz="1800">
+                <a:solidFill>
+                  <a:schemeClr val="tx1">
+                    <a:tint val="75000"/>
+                  </a:schemeClr>
+                </a:solidFill>
+              </a:defRPr>
+            </a:lvl2pPr>
+            <a:lvl3pPr marL="914400" indent="0">
+              <a:buNone/>
+              <a:defRPr sz="1600">
+                <a:solidFill>
+                  <a:schemeClr val="tx1">
+                    <a:tint val="75000"/>
+                  </a:schemeClr>
+                </a:solidFill>
+              </a:defRPr>
+            </a:lvl3pPr>
+            <a:lvl4pPr marL="1371600" indent="0">
+              <a:buNone/>
+              <a:defRPr sz="1400">
+                <a:solidFill>
+                  <a:schemeClr val="tx1">
+                    <a:tint val="75000"/>
+                  </a:schemeClr>
+                </a:solidFill>
+              </a:defRPr>
+            </a:lvl4pPr>
+            <a:lvl5pPr marL="1828800" indent="0">
+              <a:buNone/>
+              <a:defRPr sz="1400">
+                <a:solidFill>
+                  <a:schemeClr val="tx1">
+                    <a:tint val="75000"/>
+                  </a:schemeClr>
+                </a:solidFill>
+              </a:defRPr>
+            </a:lvl5pPr>
+            <a:lvl6pPr marL="2286000" indent="0">
+              <a:buNone/>
+              <a:defRPr sz="1400">
+                <a:solidFill>
+                  <a:schemeClr val="tx1">
+                    <a:tint val="75000"/>
+                  </a:schemeClr>
+                </a:solidFill>
+              </a:defRPr>
+            </a:lvl6pPr>
+            <a:lvl7pPr marL="2743200" indent="0">
+              <a:buNone/>
+              <a:defRPr sz="1400">
+                <a:solidFill>
+                  <a:schemeClr val="tx1">
+                    <a:tint val="75000"/>
+                  </a:schemeClr>
+                </a:solidFill>
+              </a:defRPr>
+            </a:lvl7pPr>
+            <a:lvl8pPr marL="3200400" indent="0">
+              <a:buNone/>
+              <a:defRPr sz="1400">
+                <a:solidFill>
+                  <a:schemeClr val="tx1">
+                    <a:tint val="75000"/>
+                  </a:schemeClr>
+                </a:solidFill>
+              </a:defRPr>
+            </a:lvl8pPr>
+            <a:lvl9pPr marL="3657600" indent="0">
+              <a:buNone/>
+              <a:defRPr sz="1400">
+                <a:solidFill>
+                  <a:schemeClr val="tx1">
+                    <a:tint val="75000"/>
+                  </a:schemeClr>
+                </a:solidFill>
+              </a:defRPr>
+            </a:lvl9pPr>
+          </a:lstStyle>
+          <a:p>
+            <a:pPr lvl="0"/>
+            <a:r>
+              <a:rPr lang="en-US" smtClean="0"/>
+              <a:t>Click to edit Master text styles</a:t>
+            </a:r>
+          </a:p>
+        </p:txBody>
+      </p:sp>
+      <p:sp>
+        <p:nvSpPr>
+          <p:cNvPr id="9" name="Text Placeholder 5"/>
+          <p:cNvSpPr>
+            <a:spLocks noGrp="1"/>
+          </p:cNvSpPr>
+          <p:nvPr>
+            <p:ph type="body" sz="quarter" idx="16"/>
+          </p:nvPr>
+        </p:nvSpPr>
+        <p:spPr>
+          <a:xfrm>
+            <a:off x="5398884" y="1338479"/>
+            <a:ext cx="3302316" cy="4075464"/>
+          </a:xfrm>
+        </p:spPr>
+        <p:txBody>
+          <a:bodyPr anchor="t"/>
+          <a:lstStyle>
+            <a:lvl1pPr marL="0" indent="0">
+              <a:buFontTx/>
+              <a:buNone/>
+              <a:defRPr/>
+            </a:lvl1pPr>
+          </a:lstStyle>
+          <a:p>
+            <a:pPr lvl="0"/>
+            <a:r>
+              <a:rPr lang="en-US" smtClean="0"/>
+              <a:t>Click to edit Master text styles</a:t>
+            </a:r>
+          </a:p>
+        </p:txBody>
+      </p:sp>
+      <p:sp>
+        <p:nvSpPr>
+          <p:cNvPr id="4" name="Date Placeholder 3"/>
+          <p:cNvSpPr>
+            <a:spLocks noGrp="1"/>
+          </p:cNvSpPr>
+          <p:nvPr>
+            <p:ph type="dt" sz="half" idx="10"/>
+          </p:nvPr>
+        </p:nvSpPr>
+        <p:spPr/>
+        <p:txBody>
+          <a:bodyPr/>
+          <a:lstStyle/>
+          <a:p>
+            <a:fld id="{A0EB2B84-A710-4304-A084-3986FE04F79C}" type="datetimeFigureOut">
+              <a:rPr lang="en-US" smtClean="0"/>
+              <a:t>12/9/2015</a:t>
+            </a:fld>
+            <a:endParaRPr lang="en-US"/>
+          </a:p>
+        </p:txBody>
+      </p:sp>
+      <p:sp>
+        <p:nvSpPr>
+          <p:cNvPr id="5" name="Footer Placeholder 4"/>
+          <p:cNvSpPr>
+            <a:spLocks noGrp="1"/>
+          </p:cNvSpPr>
+          <p:nvPr>
+            <p:ph type="ftr" sz="quarter" idx="11"/>
+          </p:nvPr>
+        </p:nvSpPr>
+        <p:spPr/>
+        <p:txBody>
+          <a:bodyPr/>
+          <a:lstStyle/>
+          <a:p>
+            <a:endParaRPr lang="en-US"/>
+          </a:p>
+        </p:txBody>
+      </p:sp>
+      <p:sp>
+        <p:nvSpPr>
+          <p:cNvPr id="6" name="Slide Number Placeholder 5"/>
+          <p:cNvSpPr>
+            <a:spLocks noGrp="1"/>
+          </p:cNvSpPr>
+          <p:nvPr>
+            <p:ph type="sldNum" sz="quarter" idx="12"/>
+          </p:nvPr>
+        </p:nvSpPr>
+        <p:spPr/>
+        <p:txBody>
+          <a:bodyPr/>
+          <a:lstStyle/>
+          <a:p>
+            <a:fld id="{484A773A-47B9-4117-9E98-033583F0143E}" type="slidenum">
+              <a:rPr lang="en-US" smtClean="0"/>
+              <a:t>‹#›</a:t>
+            </a:fld>
+            <a:endParaRPr lang="en-US"/>
+          </a:p>
+        </p:txBody>
+      </p:sp>
+    </p:spTree>
+    <p:extLst>
+      <p:ext uri="{BB962C8B-B14F-4D97-AF65-F5344CB8AC3E}">
+        <p14:creationId xmlns:p14="http://schemas.microsoft.com/office/powerpoint/2010/main" val="3865627639"/>
+      </p:ext>
+    </p:extLst>
+  </p:cSld>
+  <p:clrMapOvr>
+    <a:masterClrMapping/>
+  </p:clrMapOvr>
+</p:sldLayout>
+</file>
+
+<file path=ppt/slideLayouts/slideLayout12.xml><?xml version="1.0" encoding="utf-8"?>
+<p:sldLayout xmlns:a="http://schemas.openxmlformats.org/drawingml/2006/main" xmlns:r="http://schemas.openxmlformats.org/officeDocument/2006/relationships" xmlns:p="http://schemas.openxmlformats.org/presentationml/2006/main" preserve="1">
+  <p:cSld name="Name Card">
+    <p:spTree>
+      <p:nvGrpSpPr>
+        <p:cNvPr id="1" name=""/>
+        <p:cNvGrpSpPr/>
+        <p:nvPr/>
+      </p:nvGrpSpPr>
+      <p:grpSpPr>
+        <a:xfrm>
+          <a:off x="0" y="0"/>
+          <a:ext cx="0" cy="0"/>
+          <a:chOff x="0" y="0"/>
+          <a:chExt cx="0" cy="0"/>
+        </a:xfrm>
+      </p:grpSpPr>
+      <p:sp>
+        <p:nvSpPr>
+          <p:cNvPr id="9" name="Freeform 6"/>
+          <p:cNvSpPr>
+            <a:spLocks noChangeAspect="1"/>
+          </p:cNvSpPr>
+          <p:nvPr/>
+        </p:nvSpPr>
+        <p:spPr bwMode="auto">
+          <a:xfrm>
+            <a:off x="855663" y="2286585"/>
+            <a:ext cx="3671336" cy="2503972"/>
+          </a:xfrm>
+          <a:custGeom>
+            <a:avLst/>
+            <a:gdLst/>
+            <a:ahLst/>
+            <a:cxnLst/>
+            <a:rect l="0" t="0" r="r" b="b"/>
+            <a:pathLst>
+              <a:path w="3384" h="2308">
+                <a:moveTo>
+                  <a:pt x="3340" y="0"/>
+                </a:moveTo>
+                <a:lnTo>
+                  <a:pt x="44" y="0"/>
+                </a:lnTo>
+                <a:lnTo>
+                  <a:pt x="44" y="0"/>
+                </a:lnTo>
+                <a:lnTo>
+                  <a:pt x="34" y="0"/>
+                </a:lnTo>
+                <a:lnTo>
+                  <a:pt x="26" y="4"/>
+                </a:lnTo>
+                <a:lnTo>
+                  <a:pt x="20" y="8"/>
+                </a:lnTo>
+                <a:lnTo>
+                  <a:pt x="12" y="12"/>
+                </a:lnTo>
+                <a:lnTo>
+                  <a:pt x="8" y="20"/>
+                </a:lnTo>
+                <a:lnTo>
+                  <a:pt x="4" y="26"/>
+                </a:lnTo>
+                <a:lnTo>
+                  <a:pt x="0" y="34"/>
+                </a:lnTo>
+                <a:lnTo>
+                  <a:pt x="0" y="44"/>
+                </a:lnTo>
+                <a:lnTo>
+                  <a:pt x="0" y="2076"/>
+                </a:lnTo>
+                <a:lnTo>
+                  <a:pt x="0" y="2076"/>
+                </a:lnTo>
+                <a:lnTo>
+                  <a:pt x="0" y="2086"/>
+                </a:lnTo>
+                <a:lnTo>
+                  <a:pt x="4" y="2094"/>
+                </a:lnTo>
+                <a:lnTo>
+                  <a:pt x="8" y="2100"/>
+                </a:lnTo>
+                <a:lnTo>
+                  <a:pt x="12" y="2108"/>
+                </a:lnTo>
+                <a:lnTo>
+                  <a:pt x="20" y="2112"/>
+                </a:lnTo>
+                <a:lnTo>
+                  <a:pt x="26" y="2116"/>
+                </a:lnTo>
+                <a:lnTo>
+                  <a:pt x="34" y="2120"/>
+                </a:lnTo>
+                <a:lnTo>
+                  <a:pt x="44" y="2120"/>
+                </a:lnTo>
+                <a:lnTo>
+                  <a:pt x="474" y="2120"/>
+                </a:lnTo>
+                <a:lnTo>
+                  <a:pt x="650" y="2296"/>
+                </a:lnTo>
+                <a:lnTo>
+                  <a:pt x="650" y="2296"/>
+                </a:lnTo>
+                <a:lnTo>
+                  <a:pt x="656" y="2300"/>
+                </a:lnTo>
+                <a:lnTo>
+                  <a:pt x="664" y="2304"/>
+                </a:lnTo>
+                <a:lnTo>
+                  <a:pt x="672" y="2308"/>
+                </a:lnTo>
+                <a:lnTo>
+                  <a:pt x="680" y="2308"/>
+                </a:lnTo>
+                <a:lnTo>
+                  <a:pt x="688" y="2308"/>
+                </a:lnTo>
+                <a:lnTo>
+                  <a:pt x="696" y="2304"/>
+                </a:lnTo>
+                <a:lnTo>
+                  <a:pt x="704" y="2300"/>
+                </a:lnTo>
+                <a:lnTo>
+                  <a:pt x="710" y="2296"/>
+                </a:lnTo>
+                <a:lnTo>
+                  <a:pt x="886" y="2120"/>
+                </a:lnTo>
+                <a:lnTo>
+                  <a:pt x="3340" y="2120"/>
+                </a:lnTo>
+                <a:lnTo>
+                  <a:pt x="3340" y="2120"/>
+                </a:lnTo>
+                <a:lnTo>
+                  <a:pt x="3350" y="2120"/>
+                </a:lnTo>
+                <a:lnTo>
+                  <a:pt x="3358" y="2116"/>
+                </a:lnTo>
+                <a:lnTo>
+                  <a:pt x="3364" y="2112"/>
+                </a:lnTo>
+                <a:lnTo>
+                  <a:pt x="3372" y="2108"/>
+                </a:lnTo>
+                <a:lnTo>
+                  <a:pt x="3376" y="2100"/>
+                </a:lnTo>
+                <a:lnTo>
+                  <a:pt x="3380" y="2094"/>
+                </a:lnTo>
+                <a:lnTo>
+                  <a:pt x="3384" y="2086"/>
+                </a:lnTo>
+                <a:lnTo>
+                  <a:pt x="3384" y="2076"/>
+                </a:lnTo>
+                <a:lnTo>
+                  <a:pt x="3384" y="44"/>
+                </a:lnTo>
+                <a:lnTo>
+                  <a:pt x="3384" y="44"/>
+                </a:lnTo>
+                <a:lnTo>
+                  <a:pt x="3384" y="34"/>
+                </a:lnTo>
+                <a:lnTo>
+                  <a:pt x="3380" y="26"/>
+                </a:lnTo>
+                <a:lnTo>
+                  <a:pt x="3376" y="20"/>
+                </a:lnTo>
+                <a:lnTo>
+                  <a:pt x="3372" y="12"/>
+                </a:lnTo>
+                <a:lnTo>
+                  <a:pt x="3364" y="8"/>
+                </a:lnTo>
+                <a:lnTo>
+                  <a:pt x="3358" y="4"/>
+                </a:lnTo>
+                <a:lnTo>
+                  <a:pt x="3350" y="0"/>
+                </a:lnTo>
+                <a:lnTo>
+                  <a:pt x="3340" y="0"/>
+                </a:lnTo>
+                <a:lnTo>
+                  <a:pt x="3340" y="0"/>
+                </a:lnTo>
+                <a:close/>
+              </a:path>
+            </a:pathLst>
+          </a:custGeom>
+          <a:ln>
+            <a:solidFill>
+              <a:schemeClr val="accent1"/>
+            </a:solidFill>
+          </a:ln>
+        </p:spPr>
+        <p:style>
+          <a:lnRef idx="1">
+            <a:schemeClr val="accent1"/>
+          </a:lnRef>
+          <a:fillRef idx="3">
+            <a:schemeClr val="accent1"/>
+          </a:fillRef>
+          <a:effectRef idx="2">
+            <a:schemeClr val="accent1"/>
+          </a:effectRef>
+          <a:fontRef idx="minor">
+            <a:schemeClr val="lt1"/>
+          </a:fontRef>
+        </p:style>
+      </p:sp>
+      <p:sp>
+        <p:nvSpPr>
+          <p:cNvPr id="38" name="Title 1"/>
+          <p:cNvSpPr>
+            <a:spLocks noGrp="1"/>
+          </p:cNvSpPr>
+          <p:nvPr>
+            <p:ph type="title"/>
+          </p:nvPr>
+        </p:nvSpPr>
+        <p:spPr>
+          <a:xfrm>
+            <a:off x="1017816" y="2435956"/>
+            <a:ext cx="3286891" cy="2007789"/>
+          </a:xfrm>
+        </p:spPr>
+        <p:txBody>
+          <a:bodyPr/>
+          <a:lstStyle>
+            <a:lvl1pPr>
+              <a:defRPr sz="3200"/>
+            </a:lvl1pPr>
+          </a:lstStyle>
+          <a:p>
+            <a:r>
+              <a:rPr lang="en-US" smtClean="0"/>
+              <a:t>Click to edit Master title style</a:t>
+            </a:r>
+            <a:endParaRPr lang="en-US" dirty="0"/>
+          </a:p>
+        </p:txBody>
+      </p:sp>
+      <p:sp>
+        <p:nvSpPr>
+          <p:cNvPr id="6" name="Text Placeholder 5"/>
+          <p:cNvSpPr>
+            <a:spLocks noGrp="1"/>
+          </p:cNvSpPr>
+          <p:nvPr>
+            <p:ph type="body" sz="quarter" idx="16"/>
+          </p:nvPr>
+        </p:nvSpPr>
+        <p:spPr>
+          <a:xfrm>
+            <a:off x="4616450" y="2286000"/>
+            <a:ext cx="3671888" cy="2300288"/>
+          </a:xfrm>
+        </p:spPr>
+        <p:txBody>
+          <a:bodyPr anchor="t"/>
+          <a:lstStyle>
+            <a:lvl1pPr marL="0" indent="0">
+              <a:buFontTx/>
+              <a:buNone/>
+              <a:defRPr/>
+            </a:lvl1pPr>
+          </a:lstStyle>
+          <a:p>
+            <a:pPr lvl="0"/>
+            <a:r>
+              <a:rPr lang="en-US" smtClean="0"/>
+              <a:t>Click to edit Master text styles</a:t>
+            </a:r>
+          </a:p>
+        </p:txBody>
+      </p:sp>
+      <p:sp>
+        <p:nvSpPr>
+          <p:cNvPr id="2" name="Date Placeholder 1"/>
+          <p:cNvSpPr>
+            <a:spLocks noGrp="1"/>
+          </p:cNvSpPr>
+          <p:nvPr>
+            <p:ph type="dt" sz="half" idx="10"/>
+          </p:nvPr>
+        </p:nvSpPr>
+        <p:spPr/>
+        <p:txBody>
+          <a:bodyPr/>
+          <a:lstStyle/>
+          <a:p>
+            <a:fld id="{A0EB2B84-A710-4304-A084-3986FE04F79C}" type="datetimeFigureOut">
+              <a:rPr lang="en-US" smtClean="0"/>
+              <a:t>12/9/2015</a:t>
+            </a:fld>
+            <a:endParaRPr lang="en-US"/>
+          </a:p>
+        </p:txBody>
+      </p:sp>
+      <p:sp>
+        <p:nvSpPr>
+          <p:cNvPr id="3" name="Footer Placeholder 2"/>
+          <p:cNvSpPr>
+            <a:spLocks noGrp="1"/>
+          </p:cNvSpPr>
+          <p:nvPr>
+            <p:ph type="ftr" sz="quarter" idx="11"/>
+          </p:nvPr>
+        </p:nvSpPr>
+        <p:spPr/>
+        <p:txBody>
+          <a:bodyPr/>
+          <a:lstStyle/>
+          <a:p>
+            <a:endParaRPr lang="en-US"/>
+          </a:p>
+        </p:txBody>
+      </p:sp>
+      <p:sp>
+        <p:nvSpPr>
+          <p:cNvPr id="4" name="Slide Number Placeholder 3"/>
+          <p:cNvSpPr>
+            <a:spLocks noGrp="1"/>
+          </p:cNvSpPr>
+          <p:nvPr>
+            <p:ph type="sldNum" sz="quarter" idx="12"/>
+          </p:nvPr>
+        </p:nvSpPr>
+        <p:spPr/>
+        <p:txBody>
+          <a:bodyPr/>
+          <a:lstStyle/>
+          <a:p>
+            <a:fld id="{484A773A-47B9-4117-9E98-033583F0143E}" type="slidenum">
+              <a:rPr lang="en-US" smtClean="0"/>
+              <a:t>‹#›</a:t>
+            </a:fld>
+            <a:endParaRPr lang="en-US"/>
+          </a:p>
+        </p:txBody>
+      </p:sp>
+    </p:spTree>
+    <p:extLst>
+      <p:ext uri="{BB962C8B-B14F-4D97-AF65-F5344CB8AC3E}">
+        <p14:creationId xmlns:p14="http://schemas.microsoft.com/office/powerpoint/2010/main" val="2813626342"/>
+      </p:ext>
+    </p:extLst>
+  </p:cSld>
+  <p:clrMapOvr>
+    <a:masterClrMapping/>
+  </p:clrMapOvr>
+</p:sldLayout>
+</file>
+
+<file path=ppt/slideLayouts/slideLayout13.xml><?xml version="1.0" encoding="utf-8"?>
 <p:sldLayout xmlns:a="http://schemas.openxmlformats.org/drawingml/2006/main" xmlns:r="http://schemas.openxmlformats.org/officeDocument/2006/relationships" xmlns:p="http://schemas.openxmlformats.org/presentationml/2006/main" type="vertTx" preserve="1">
   <p:cSld name="Title and Vertical Text">
     <p:spTree>
@@ -374,6 +1672,109 @@
       </p:grpSpPr>
       <p:sp>
         <p:nvSpPr>
+          <p:cNvPr id="7" name="Freeform 6"/>
+          <p:cNvSpPr/>
+          <p:nvPr/>
+        </p:nvSpPr>
+        <p:spPr bwMode="auto">
+          <a:xfrm>
+            <a:off x="0" y="0"/>
+            <a:ext cx="9144000" cy="2185988"/>
+          </a:xfrm>
+          <a:custGeom>
+            <a:avLst/>
+            <a:gdLst/>
+            <a:ahLst/>
+            <a:cxnLst/>
+            <a:rect l="0" t="0" r="r" b="b"/>
+            <a:pathLst>
+              <a:path w="5760" h="1377">
+                <a:moveTo>
+                  <a:pt x="5760" y="0"/>
+                </a:moveTo>
+                <a:lnTo>
+                  <a:pt x="0" y="0"/>
+                </a:lnTo>
+                <a:lnTo>
+                  <a:pt x="0" y="1189"/>
+                </a:lnTo>
+                <a:lnTo>
+                  <a:pt x="943" y="1189"/>
+                </a:lnTo>
+                <a:lnTo>
+                  <a:pt x="1123" y="1369"/>
+                </a:lnTo>
+                <a:lnTo>
+                  <a:pt x="1123" y="1369"/>
+                </a:lnTo>
+                <a:lnTo>
+                  <a:pt x="1127" y="1371"/>
+                </a:lnTo>
+                <a:lnTo>
+                  <a:pt x="1133" y="1374"/>
+                </a:lnTo>
+                <a:lnTo>
+                  <a:pt x="1139" y="1377"/>
+                </a:lnTo>
+                <a:lnTo>
+                  <a:pt x="1144" y="1377"/>
+                </a:lnTo>
+                <a:lnTo>
+                  <a:pt x="1150" y="1377"/>
+                </a:lnTo>
+                <a:lnTo>
+                  <a:pt x="1155" y="1374"/>
+                </a:lnTo>
+                <a:lnTo>
+                  <a:pt x="1161" y="1371"/>
+                </a:lnTo>
+                <a:lnTo>
+                  <a:pt x="1165" y="1369"/>
+                </a:lnTo>
+                <a:lnTo>
+                  <a:pt x="1345" y="1189"/>
+                </a:lnTo>
+                <a:lnTo>
+                  <a:pt x="5760" y="1189"/>
+                </a:lnTo>
+                <a:lnTo>
+                  <a:pt x="5760" y="0"/>
+                </a:lnTo>
+                <a:close/>
+              </a:path>
+            </a:pathLst>
+          </a:custGeom>
+          <a:ln/>
+          <a:extLst>
+            <a:ext uri="{91240B29-F687-4F45-9708-019B960494DF}">
+              <a14:hiddenLine xmlns:a14="http://schemas.microsoft.com/office/drawing/2010/main" w="9525">
+                <a:solidFill>
+                  <a:srgbClr val="000000"/>
+                </a:solidFill>
+                <a:round/>
+                <a:headEnd/>
+                <a:tailEnd/>
+              </a14:hiddenLine>
+            </a:ext>
+          </a:extLst>
+        </p:spPr>
+        <p:style>
+          <a:lnRef idx="1">
+            <a:schemeClr val="accent1"/>
+          </a:lnRef>
+          <a:fillRef idx="3">
+            <a:schemeClr val="accent1"/>
+          </a:fillRef>
+          <a:effectRef idx="2">
+            <a:schemeClr val="accent1"/>
+          </a:effectRef>
+          <a:fontRef idx="minor">
+            <a:schemeClr val="lt1"/>
+          </a:fontRef>
+        </p:style>
+      </p:sp>
+      <p:sp>
+        <p:nvSpPr>
           <p:cNvPr id="2" name="Title 1"/>
           <p:cNvSpPr>
             <a:spLocks noGrp="1"/>
@@ -391,7 +1792,7 @@
               <a:rPr lang="en-US" smtClean="0"/>
               <a:t>Click to edit Master title style</a:t>
             </a:r>
-            <a:endParaRPr lang="en-US"/>
+            <a:endParaRPr lang="en-US" dirty="0"/>
           </a:p>
         </p:txBody>
       </p:sp>
@@ -407,7 +1808,7 @@
         </p:nvSpPr>
         <p:spPr/>
         <p:txBody>
-          <a:bodyPr vert="eaVert"/>
+          <a:bodyPr vert="eaVert" anchor="t"/>
           <a:lstStyle/>
           <a:p>
             <a:pPr lvl="0"/>
@@ -443,7 +1844,7 @@
               <a:rPr lang="en-US" smtClean="0"/>
               <a:t>Fifth level</a:t>
             </a:r>
-            <a:endParaRPr lang="en-US"/>
+            <a:endParaRPr lang="en-US" dirty="0"/>
           </a:p>
         </p:txBody>
       </p:sp>
@@ -515,7 +1916,7 @@
     </p:spTree>
     <p:extLst>
       <p:ext uri="{BB962C8B-B14F-4D97-AF65-F5344CB8AC3E}">
-        <p14:creationId xmlns:p14="http://schemas.microsoft.com/office/powerpoint/2010/main" val="2664561975"/>
+        <p14:creationId xmlns:p14="http://schemas.microsoft.com/office/powerpoint/2010/main" val="50552582"/>
       </p:ext>
     </p:extLst>
   </p:cSld>
@@ -525,7 +1926,7 @@
 </p:sldLayout>
 </file>
 
-<file path=ppt/slideLayouts/slideLayout11.xml><?xml version="1.0" encoding="utf-8"?>
+<file path=ppt/slideLayouts/slideLayout14.xml><?xml version="1.0" encoding="utf-8"?>
 <p:sldLayout xmlns:a="http://schemas.openxmlformats.org/drawingml/2006/main" xmlns:r="http://schemas.openxmlformats.org/officeDocument/2006/relationships" xmlns:p="http://schemas.openxmlformats.org/presentationml/2006/main" type="vertTitleAndTx" preserve="1">
   <p:cSld name="Vertical Title and Text">
     <p:spTree>
@@ -544,6 +1945,152 @@
       </p:grpSpPr>
       <p:sp>
         <p:nvSpPr>
+          <p:cNvPr id="12" name="Freeform 6"/>
+          <p:cNvSpPr>
+            <a:spLocks noChangeAspect="1"/>
+          </p:cNvSpPr>
+          <p:nvPr/>
+        </p:nvSpPr>
+        <p:spPr bwMode="auto">
+          <a:xfrm>
+            <a:off x="5752238" y="446089"/>
+            <a:ext cx="3391762" cy="5414962"/>
+          </a:xfrm>
+          <a:custGeom>
+            <a:avLst/>
+            <a:gdLst/>
+            <a:ahLst/>
+            <a:cxnLst/>
+            <a:rect l="0" t="0" r="r" b="b"/>
+            <a:pathLst>
+              <a:path w="2879" h="4320">
+                <a:moveTo>
+                  <a:pt x="183" y="0"/>
+                </a:moveTo>
+                <a:lnTo>
+                  <a:pt x="183" y="1197"/>
+                </a:lnTo>
+                <a:lnTo>
+                  <a:pt x="8" y="1372"/>
+                </a:lnTo>
+                <a:lnTo>
+                  <a:pt x="8" y="1372"/>
+                </a:lnTo>
+                <a:lnTo>
+                  <a:pt x="6" y="1376"/>
+                </a:lnTo>
+                <a:lnTo>
+                  <a:pt x="3" y="1382"/>
+                </a:lnTo>
+                <a:lnTo>
+                  <a:pt x="0" y="1387"/>
+                </a:lnTo>
+                <a:lnTo>
+                  <a:pt x="0" y="1393"/>
+                </a:lnTo>
+                <a:lnTo>
+                  <a:pt x="0" y="1399"/>
+                </a:lnTo>
+                <a:lnTo>
+                  <a:pt x="3" y="1404"/>
+                </a:lnTo>
+                <a:lnTo>
+                  <a:pt x="6" y="1410"/>
+                </a:lnTo>
+                <a:lnTo>
+                  <a:pt x="8" y="1414"/>
+                </a:lnTo>
+                <a:lnTo>
+                  <a:pt x="183" y="1589"/>
+                </a:lnTo>
+                <a:lnTo>
+                  <a:pt x="183" y="4320"/>
+                </a:lnTo>
+                <a:lnTo>
+                  <a:pt x="2879" y="4320"/>
+                </a:lnTo>
+                <a:lnTo>
+                  <a:pt x="2879" y="0"/>
+                </a:lnTo>
+                <a:lnTo>
+                  <a:pt x="183" y="0"/>
+                </a:lnTo>
+                <a:close/>
+              </a:path>
+            </a:pathLst>
+          </a:custGeom>
+          <a:ln/>
+          <a:extLst>
+            <a:ext uri="{91240B29-F687-4F45-9708-019B960494DF}">
+              <a14:hiddenLine xmlns:a14="http://schemas.microsoft.com/office/drawing/2010/main" w="9525">
+                <a:solidFill>
+                  <a:srgbClr val="000000"/>
+                </a:solidFill>
+                <a:round/>
+                <a:headEnd/>
+                <a:tailEnd/>
+              </a14:hiddenLine>
+            </a:ext>
+          </a:extLst>
+        </p:spPr>
+        <p:style>
+          <a:lnRef idx="1">
+            <a:schemeClr val="accent1"/>
+          </a:lnRef>
+          <a:fillRef idx="3">
+            <a:schemeClr val="accent1"/>
+          </a:fillRef>
+          <a:effectRef idx="2">
+            <a:schemeClr val="accent1"/>
+          </a:effectRef>
+          <a:fontRef idx="minor">
+            <a:schemeClr val="lt1"/>
+          </a:fontRef>
+        </p:style>
+      </p:sp>
+      <p:sp>
+        <p:nvSpPr>
+          <p:cNvPr id="9" name="AutoShape 4"/>
+          <p:cNvSpPr>
+            <a:spLocks noChangeAspect="1" noChangeArrowheads="1" noTextEdit="1"/>
+          </p:cNvSpPr>
+          <p:nvPr/>
+        </p:nvSpPr>
+        <p:spPr bwMode="auto">
+          <a:xfrm>
+            <a:off x="5233988" y="0"/>
+            <a:ext cx="3910012" cy="5867400"/>
+          </a:xfrm>
+          <a:prstGeom prst="rect">
+            <a:avLst/>
+          </a:prstGeom>
+          <a:noFill/>
+          <a:ln>
+            <a:noFill/>
+          </a:ln>
+          <a:extLst>
+            <a:ext uri="{909E8E84-426E-40DD-AFC4-6F175D3DCCD1}">
+              <a14:hiddenFill xmlns:a14="http://schemas.microsoft.com/office/drawing/2010/main">
+                <a:solidFill>
+                  <a:srgbClr val="FFFFFF"/>
+                </a:solidFill>
+              </a14:hiddenFill>
+            </a:ext>
+            <a:ext uri="{91240B29-F687-4F45-9708-019B960494DF}">
+              <a14:hiddenLine xmlns:a14="http://schemas.microsoft.com/office/drawing/2010/main" w="9525">
+                <a:solidFill>
+                  <a:srgbClr val="000000"/>
+                </a:solidFill>
+                <a:miter lim="800000"/>
+                <a:headEnd/>
+                <a:tailEnd/>
+              </a14:hiddenLine>
+            </a:ext>
+          </a:extLst>
+        </p:spPr>
+      </p:sp>
+      <p:sp>
+        <p:nvSpPr>
           <p:cNvPr id="2" name="Vertical Title 1"/>
           <p:cNvSpPr>
             <a:spLocks noGrp="1"/>
@@ -554,8 +2101,8 @@
         </p:nvSpPr>
         <p:spPr>
           <a:xfrm>
-            <a:off x="6629400" y="274638"/>
-            <a:ext cx="2057400" cy="5851525"/>
+            <a:off x="6137655" y="586171"/>
+            <a:ext cx="1701800" cy="5134798"/>
           </a:xfrm>
         </p:spPr>
         <p:txBody>
@@ -566,7 +2113,7 @@
               <a:rPr lang="en-US" smtClean="0"/>
               <a:t>Click to edit Master title style</a:t>
             </a:r>
-            <a:endParaRPr lang="en-US"/>
+            <a:endParaRPr lang="en-US" dirty="0"/>
           </a:p>
         </p:txBody>
       </p:sp>
@@ -582,12 +2129,12 @@
         </p:nvSpPr>
         <p:spPr>
           <a:xfrm>
-            <a:off x="457200" y="274638"/>
-            <a:ext cx="6019800" cy="5851525"/>
+            <a:off x="804862" y="446089"/>
+            <a:ext cx="4947376" cy="5414962"/>
           </a:xfrm>
         </p:spPr>
         <p:txBody>
-          <a:bodyPr vert="eaVert"/>
+          <a:bodyPr vert="eaVert" anchor="t"/>
           <a:lstStyle/>
           <a:p>
             <a:pPr lvl="0"/>
@@ -623,7 +2170,7 @@
               <a:rPr lang="en-US" smtClean="0"/>
               <a:t>Fifth level</a:t>
             </a:r>
-            <a:endParaRPr lang="en-US"/>
+            <a:endParaRPr lang="en-US" dirty="0"/>
           </a:p>
         </p:txBody>
       </p:sp>
@@ -695,7 +2242,7 @@
     </p:spTree>
     <p:extLst>
       <p:ext uri="{BB962C8B-B14F-4D97-AF65-F5344CB8AC3E}">
-        <p14:creationId xmlns:p14="http://schemas.microsoft.com/office/powerpoint/2010/main" val="121956545"/>
+        <p14:creationId xmlns:p14="http://schemas.microsoft.com/office/powerpoint/2010/main" val="1083460195"/>
       </p:ext>
     </p:extLst>
   </p:cSld>
@@ -724,6 +2271,109 @@
       </p:grpSpPr>
       <p:sp>
         <p:nvSpPr>
+          <p:cNvPr id="11" name="Freeform 6"/>
+          <p:cNvSpPr/>
+          <p:nvPr/>
+        </p:nvSpPr>
+        <p:spPr bwMode="auto">
+          <a:xfrm>
+            <a:off x="0" y="0"/>
+            <a:ext cx="9144000" cy="2185988"/>
+          </a:xfrm>
+          <a:custGeom>
+            <a:avLst/>
+            <a:gdLst/>
+            <a:ahLst/>
+            <a:cxnLst/>
+            <a:rect l="0" t="0" r="r" b="b"/>
+            <a:pathLst>
+              <a:path w="5760" h="1377">
+                <a:moveTo>
+                  <a:pt x="5760" y="0"/>
+                </a:moveTo>
+                <a:lnTo>
+                  <a:pt x="0" y="0"/>
+                </a:lnTo>
+                <a:lnTo>
+                  <a:pt x="0" y="1189"/>
+                </a:lnTo>
+                <a:lnTo>
+                  <a:pt x="943" y="1189"/>
+                </a:lnTo>
+                <a:lnTo>
+                  <a:pt x="1123" y="1369"/>
+                </a:lnTo>
+                <a:lnTo>
+                  <a:pt x="1123" y="1369"/>
+                </a:lnTo>
+                <a:lnTo>
+                  <a:pt x="1127" y="1371"/>
+                </a:lnTo>
+                <a:lnTo>
+                  <a:pt x="1133" y="1374"/>
+                </a:lnTo>
+                <a:lnTo>
+                  <a:pt x="1139" y="1377"/>
+                </a:lnTo>
+                <a:lnTo>
+                  <a:pt x="1144" y="1377"/>
+                </a:lnTo>
+                <a:lnTo>
+                  <a:pt x="1150" y="1377"/>
+                </a:lnTo>
+                <a:lnTo>
+                  <a:pt x="1155" y="1374"/>
+                </a:lnTo>
+                <a:lnTo>
+                  <a:pt x="1161" y="1371"/>
+                </a:lnTo>
+                <a:lnTo>
+                  <a:pt x="1165" y="1369"/>
+                </a:lnTo>
+                <a:lnTo>
+                  <a:pt x="1345" y="1189"/>
+                </a:lnTo>
+                <a:lnTo>
+                  <a:pt x="5760" y="1189"/>
+                </a:lnTo>
+                <a:lnTo>
+                  <a:pt x="5760" y="0"/>
+                </a:lnTo>
+                <a:close/>
+              </a:path>
+            </a:pathLst>
+          </a:custGeom>
+          <a:ln/>
+          <a:extLst>
+            <a:ext uri="{91240B29-F687-4F45-9708-019B960494DF}">
+              <a14:hiddenLine xmlns:a14="http://schemas.microsoft.com/office/drawing/2010/main" w="9525">
+                <a:solidFill>
+                  <a:srgbClr val="000000"/>
+                </a:solidFill>
+                <a:round/>
+                <a:headEnd/>
+                <a:tailEnd/>
+              </a14:hiddenLine>
+            </a:ext>
+          </a:extLst>
+        </p:spPr>
+        <p:style>
+          <a:lnRef idx="1">
+            <a:schemeClr val="accent1"/>
+          </a:lnRef>
+          <a:fillRef idx="3">
+            <a:schemeClr val="accent1"/>
+          </a:fillRef>
+          <a:effectRef idx="2">
+            <a:schemeClr val="accent1"/>
+          </a:effectRef>
+          <a:fontRef idx="minor">
+            <a:schemeClr val="lt1"/>
+          </a:fontRef>
+        </p:style>
+      </p:sp>
+      <p:sp>
+        <p:nvSpPr>
           <p:cNvPr id="2" name="Title 1"/>
           <p:cNvSpPr>
             <a:spLocks noGrp="1"/>
@@ -741,7 +2391,7 @@
               <a:rPr lang="en-US" smtClean="0"/>
               <a:t>Click to edit Master title style</a:t>
             </a:r>
-            <a:endParaRPr lang="en-US"/>
+            <a:endParaRPr lang="en-US" dirty="0"/>
           </a:p>
         </p:txBody>
       </p:sp>
@@ -755,7 +2405,12 @@
             <p:ph idx="1"/>
           </p:nvPr>
         </p:nvSpPr>
-        <p:spPr/>
+        <p:spPr>
+          <a:xfrm>
+            <a:off x="809997" y="2222287"/>
+            <a:ext cx="7524003" cy="3636510"/>
+          </a:xfrm>
+        </p:spPr>
         <p:txBody>
           <a:bodyPr/>
           <a:lstStyle/>
@@ -793,7 +2448,7 @@
               <a:rPr lang="en-US" smtClean="0"/>
               <a:t>Fifth level</a:t>
             </a:r>
-            <a:endParaRPr lang="en-US"/>
+            <a:endParaRPr lang="en-US" dirty="0"/>
           </a:p>
         </p:txBody>
       </p:sp>
@@ -865,7 +2520,7 @@
     </p:spTree>
     <p:extLst>
       <p:ext uri="{BB962C8B-B14F-4D97-AF65-F5344CB8AC3E}">
-        <p14:creationId xmlns:p14="http://schemas.microsoft.com/office/powerpoint/2010/main" val="262813876"/>
+        <p14:creationId xmlns:p14="http://schemas.microsoft.com/office/powerpoint/2010/main" val="3206967491"/>
       </p:ext>
     </p:extLst>
   </p:cSld>
@@ -894,6 +2549,103 @@
       </p:grpSpPr>
       <p:sp>
         <p:nvSpPr>
+          <p:cNvPr id="10" name="Freeform 7"/>
+          <p:cNvSpPr/>
+          <p:nvPr/>
+        </p:nvSpPr>
+        <p:spPr bwMode="auto">
+          <a:xfrm>
+            <a:off x="0" y="0"/>
+            <a:ext cx="9144000" cy="5203825"/>
+          </a:xfrm>
+          <a:custGeom>
+            <a:avLst/>
+            <a:gdLst/>
+            <a:ahLst/>
+            <a:cxnLst/>
+            <a:rect l="0" t="0" r="r" b="b"/>
+            <a:pathLst>
+              <a:path w="5760" h="3278">
+                <a:moveTo>
+                  <a:pt x="0" y="0"/>
+                </a:moveTo>
+                <a:lnTo>
+                  <a:pt x="5760" y="0"/>
+                </a:lnTo>
+                <a:lnTo>
+                  <a:pt x="5760" y="3090"/>
+                </a:lnTo>
+                <a:lnTo>
+                  <a:pt x="4817" y="3090"/>
+                </a:lnTo>
+                <a:lnTo>
+                  <a:pt x="4637" y="3270"/>
+                </a:lnTo>
+                <a:lnTo>
+                  <a:pt x="4637" y="3270"/>
+                </a:lnTo>
+                <a:lnTo>
+                  <a:pt x="4633" y="3272"/>
+                </a:lnTo>
+                <a:lnTo>
+                  <a:pt x="4627" y="3275"/>
+                </a:lnTo>
+                <a:lnTo>
+                  <a:pt x="4621" y="3278"/>
+                </a:lnTo>
+                <a:lnTo>
+                  <a:pt x="4616" y="3278"/>
+                </a:lnTo>
+                <a:lnTo>
+                  <a:pt x="4610" y="3278"/>
+                </a:lnTo>
+                <a:lnTo>
+                  <a:pt x="4605" y="3275"/>
+                </a:lnTo>
+                <a:lnTo>
+                  <a:pt x="4599" y="3272"/>
+                </a:lnTo>
+                <a:lnTo>
+                  <a:pt x="4595" y="3270"/>
+                </a:lnTo>
+                <a:lnTo>
+                  <a:pt x="4415" y="3090"/>
+                </a:lnTo>
+                <a:lnTo>
+                  <a:pt x="0" y="3090"/>
+                </a:lnTo>
+                <a:lnTo>
+                  <a:pt x="0" y="0"/>
+                </a:lnTo>
+                <a:lnTo>
+                  <a:pt x="0" y="0"/>
+                </a:lnTo>
+                <a:close/>
+              </a:path>
+            </a:pathLst>
+          </a:custGeom>
+          <a:ln>
+            <a:headEnd/>
+            <a:tailEnd/>
+          </a:ln>
+        </p:spPr>
+        <p:style>
+          <a:lnRef idx="1">
+            <a:schemeClr val="accent1"/>
+          </a:lnRef>
+          <a:fillRef idx="3">
+            <a:schemeClr val="accent1"/>
+          </a:fillRef>
+          <a:effectRef idx="2">
+            <a:schemeClr val="accent1"/>
+          </a:effectRef>
+          <a:fontRef idx="minor">
+            <a:schemeClr val="lt1"/>
+          </a:fontRef>
+        </p:style>
+      </p:sp>
+      <p:sp>
+        <p:nvSpPr>
           <p:cNvPr id="2" name="Title 1"/>
           <p:cNvSpPr>
             <a:spLocks noGrp="1"/>
@@ -904,15 +2656,15 @@
         </p:nvSpPr>
         <p:spPr>
           <a:xfrm>
-            <a:off x="722313" y="4406900"/>
-            <a:ext cx="7772400" cy="1362075"/>
+            <a:off x="804863" y="2951396"/>
+            <a:ext cx="7526337" cy="1468800"/>
           </a:xfrm>
         </p:spPr>
         <p:txBody>
-          <a:bodyPr anchor="t"/>
+          <a:bodyPr anchor="b"/>
           <a:lstStyle>
-            <a:lvl1pPr algn="l">
-              <a:defRPr sz="4000" b="1" cap="all"/>
+            <a:lvl1pPr algn="r">
+              <a:defRPr sz="4800" b="1" cap="none"/>
             </a:lvl1pPr>
           </a:lstStyle>
           <a:p>
@@ -920,7 +2672,7 @@
               <a:rPr lang="en-US" smtClean="0"/>
               <a:t>Click to edit Master title style</a:t>
             </a:r>
-            <a:endParaRPr lang="en-US"/>
+            <a:endParaRPr lang="en-US" dirty="0"/>
           </a:p>
         </p:txBody>
       </p:sp>
@@ -936,20 +2688,20 @@
         </p:nvSpPr>
         <p:spPr>
           <a:xfrm>
-            <a:off x="722313" y="2906713"/>
-            <a:ext cx="7772400" cy="1500187"/>
+            <a:off x="804863" y="5281200"/>
+            <a:ext cx="7526337" cy="433955"/>
           </a:xfrm>
         </p:spPr>
         <p:txBody>
-          <a:bodyPr anchor="b"/>
+          <a:bodyPr anchor="t">
+            <a:noAutofit/>
+          </a:bodyPr>
           <a:lstStyle>
-            <a:lvl1pPr marL="0" indent="0">
-              <a:buNone/>
-              <a:defRPr sz="2000">
+            <a:lvl1pPr marL="0" indent="0" algn="r">
+              <a:buNone/>
+              <a:defRPr sz="1800">
                 <a:solidFill>
-                  <a:schemeClr val="tx1">
-                    <a:tint val="75000"/>
-                  </a:schemeClr>
+                  <a:schemeClr val="tx1"/>
                 </a:solidFill>
               </a:defRPr>
             </a:lvl1pPr>
@@ -1111,7 +2863,7 @@
     </p:spTree>
     <p:extLst>
       <p:ext uri="{BB962C8B-B14F-4D97-AF65-F5344CB8AC3E}">
-        <p14:creationId xmlns:p14="http://schemas.microsoft.com/office/powerpoint/2010/main" val="3461864560"/>
+        <p14:creationId xmlns:p14="http://schemas.microsoft.com/office/powerpoint/2010/main" val="365653130"/>
       </p:ext>
     </p:extLst>
   </p:cSld>
@@ -1140,6 +2892,109 @@
       </p:grpSpPr>
       <p:sp>
         <p:nvSpPr>
+          <p:cNvPr id="8" name="Freeform 6"/>
+          <p:cNvSpPr/>
+          <p:nvPr/>
+        </p:nvSpPr>
+        <p:spPr bwMode="auto">
+          <a:xfrm>
+            <a:off x="0" y="0"/>
+            <a:ext cx="9144000" cy="2185988"/>
+          </a:xfrm>
+          <a:custGeom>
+            <a:avLst/>
+            <a:gdLst/>
+            <a:ahLst/>
+            <a:cxnLst/>
+            <a:rect l="0" t="0" r="r" b="b"/>
+            <a:pathLst>
+              <a:path w="5760" h="1377">
+                <a:moveTo>
+                  <a:pt x="5760" y="0"/>
+                </a:moveTo>
+                <a:lnTo>
+                  <a:pt x="0" y="0"/>
+                </a:lnTo>
+                <a:lnTo>
+                  <a:pt x="0" y="1189"/>
+                </a:lnTo>
+                <a:lnTo>
+                  <a:pt x="943" y="1189"/>
+                </a:lnTo>
+                <a:lnTo>
+                  <a:pt x="1123" y="1369"/>
+                </a:lnTo>
+                <a:lnTo>
+                  <a:pt x="1123" y="1369"/>
+                </a:lnTo>
+                <a:lnTo>
+                  <a:pt x="1127" y="1371"/>
+                </a:lnTo>
+                <a:lnTo>
+                  <a:pt x="1133" y="1374"/>
+                </a:lnTo>
+                <a:lnTo>
+                  <a:pt x="1139" y="1377"/>
+                </a:lnTo>
+                <a:lnTo>
+                  <a:pt x="1144" y="1377"/>
+                </a:lnTo>
+                <a:lnTo>
+                  <a:pt x="1150" y="1377"/>
+                </a:lnTo>
+                <a:lnTo>
+                  <a:pt x="1155" y="1374"/>
+                </a:lnTo>
+                <a:lnTo>
+                  <a:pt x="1161" y="1371"/>
+                </a:lnTo>
+                <a:lnTo>
+                  <a:pt x="1165" y="1369"/>
+                </a:lnTo>
+                <a:lnTo>
+                  <a:pt x="1345" y="1189"/>
+                </a:lnTo>
+                <a:lnTo>
+                  <a:pt x="5760" y="1189"/>
+                </a:lnTo>
+                <a:lnTo>
+                  <a:pt x="5760" y="0"/>
+                </a:lnTo>
+                <a:close/>
+              </a:path>
+            </a:pathLst>
+          </a:custGeom>
+          <a:ln/>
+          <a:extLst>
+            <a:ext uri="{91240B29-F687-4F45-9708-019B960494DF}">
+              <a14:hiddenLine xmlns:a14="http://schemas.microsoft.com/office/drawing/2010/main" w="9525">
+                <a:solidFill>
+                  <a:srgbClr val="000000"/>
+                </a:solidFill>
+                <a:round/>
+                <a:headEnd/>
+                <a:tailEnd/>
+              </a14:hiddenLine>
+            </a:ext>
+          </a:extLst>
+        </p:spPr>
+        <p:style>
+          <a:lnRef idx="1">
+            <a:schemeClr val="accent1"/>
+          </a:lnRef>
+          <a:fillRef idx="3">
+            <a:schemeClr val="accent1"/>
+          </a:fillRef>
+          <a:effectRef idx="2">
+            <a:schemeClr val="accent1"/>
+          </a:effectRef>
+          <a:fontRef idx="minor">
+            <a:schemeClr val="lt1"/>
+          </a:fontRef>
+        </p:style>
+      </p:sp>
+      <p:sp>
+        <p:nvSpPr>
           <p:cNvPr id="2" name="Title 1"/>
           <p:cNvSpPr>
             <a:spLocks noGrp="1"/>
@@ -1157,7 +3012,7 @@
               <a:rPr lang="en-US" smtClean="0"/>
               <a:t>Click to edit Master title style</a:t>
             </a:r>
-            <a:endParaRPr lang="en-US"/>
+            <a:endParaRPr lang="en-US" dirty="0"/>
           </a:p>
         </p:txBody>
       </p:sp>
@@ -1173,41 +3028,15 @@
         </p:nvSpPr>
         <p:spPr>
           <a:xfrm>
-            <a:off x="457200" y="1600200"/>
-            <a:ext cx="4038600" cy="4525963"/>
+            <a:off x="809996" y="2222287"/>
+            <a:ext cx="3670723" cy="3638763"/>
           </a:xfrm>
         </p:spPr>
         <p:txBody>
-          <a:bodyPr/>
-          <a:lstStyle>
-            <a:lvl1pPr>
-              <a:defRPr sz="2800"/>
-            </a:lvl1pPr>
-            <a:lvl2pPr>
-              <a:defRPr sz="2400"/>
-            </a:lvl2pPr>
-            <a:lvl3pPr>
-              <a:defRPr sz="2000"/>
-            </a:lvl3pPr>
-            <a:lvl4pPr>
-              <a:defRPr sz="1800"/>
-            </a:lvl4pPr>
-            <a:lvl5pPr>
-              <a:defRPr sz="1800"/>
-            </a:lvl5pPr>
-            <a:lvl6pPr>
-              <a:defRPr sz="1800"/>
-            </a:lvl6pPr>
-            <a:lvl7pPr>
-              <a:defRPr sz="1800"/>
-            </a:lvl7pPr>
-            <a:lvl8pPr>
-              <a:defRPr sz="1800"/>
-            </a:lvl8pPr>
-            <a:lvl9pPr>
-              <a:defRPr sz="1800"/>
-            </a:lvl9pPr>
-          </a:lstStyle>
+          <a:bodyPr>
+            <a:normAutofit/>
+          </a:bodyPr>
+          <a:lstStyle/>
           <a:p>
             <a:pPr lvl="0"/>
             <a:r>
@@ -1242,7 +3071,7 @@
               <a:rPr lang="en-US" smtClean="0"/>
               <a:t>Fifth level</a:t>
             </a:r>
-            <a:endParaRPr lang="en-US"/>
+            <a:endParaRPr lang="en-US" dirty="0"/>
           </a:p>
         </p:txBody>
       </p:sp>
@@ -1258,41 +3087,15 @@
         </p:nvSpPr>
         <p:spPr>
           <a:xfrm>
-            <a:off x="4648200" y="1600200"/>
-            <a:ext cx="4038600" cy="4525963"/>
+            <a:off x="4663280" y="2222287"/>
+            <a:ext cx="3670720" cy="3638763"/>
           </a:xfrm>
         </p:spPr>
         <p:txBody>
-          <a:bodyPr/>
-          <a:lstStyle>
-            <a:lvl1pPr>
-              <a:defRPr sz="2800"/>
-            </a:lvl1pPr>
-            <a:lvl2pPr>
-              <a:defRPr sz="2400"/>
-            </a:lvl2pPr>
-            <a:lvl3pPr>
-              <a:defRPr sz="2000"/>
-            </a:lvl3pPr>
-            <a:lvl4pPr>
-              <a:defRPr sz="1800"/>
-            </a:lvl4pPr>
-            <a:lvl5pPr>
-              <a:defRPr sz="1800"/>
-            </a:lvl5pPr>
-            <a:lvl6pPr>
-              <a:defRPr sz="1800"/>
-            </a:lvl6pPr>
-            <a:lvl7pPr>
-              <a:defRPr sz="1800"/>
-            </a:lvl7pPr>
-            <a:lvl8pPr>
-              <a:defRPr sz="1800"/>
-            </a:lvl8pPr>
-            <a:lvl9pPr>
-              <a:defRPr sz="1800"/>
-            </a:lvl9pPr>
-          </a:lstStyle>
+          <a:bodyPr>
+            <a:normAutofit/>
+          </a:bodyPr>
+          <a:lstStyle/>
           <a:p>
             <a:pPr lvl="0"/>
             <a:r>
@@ -1327,7 +3130,7 @@
               <a:rPr lang="en-US" smtClean="0"/>
               <a:t>Fifth level</a:t>
             </a:r>
-            <a:endParaRPr lang="en-US"/>
+            <a:endParaRPr lang="en-US" dirty="0"/>
           </a:p>
         </p:txBody>
       </p:sp>
@@ -1399,7 +3202,7 @@
     </p:spTree>
     <p:extLst>
       <p:ext uri="{BB962C8B-B14F-4D97-AF65-F5344CB8AC3E}">
-        <p14:creationId xmlns:p14="http://schemas.microsoft.com/office/powerpoint/2010/main" val="586413888"/>
+        <p14:creationId xmlns:p14="http://schemas.microsoft.com/office/powerpoint/2010/main" val="3073936403"/>
       </p:ext>
     </p:extLst>
   </p:cSld>
@@ -1428,6 +3231,109 @@
       </p:grpSpPr>
       <p:sp>
         <p:nvSpPr>
+          <p:cNvPr id="10" name="Freeform 6"/>
+          <p:cNvSpPr/>
+          <p:nvPr/>
+        </p:nvSpPr>
+        <p:spPr bwMode="auto">
+          <a:xfrm>
+            <a:off x="0" y="0"/>
+            <a:ext cx="9144000" cy="2185988"/>
+          </a:xfrm>
+          <a:custGeom>
+            <a:avLst/>
+            <a:gdLst/>
+            <a:ahLst/>
+            <a:cxnLst/>
+            <a:rect l="0" t="0" r="r" b="b"/>
+            <a:pathLst>
+              <a:path w="5760" h="1377">
+                <a:moveTo>
+                  <a:pt x="5760" y="0"/>
+                </a:moveTo>
+                <a:lnTo>
+                  <a:pt x="0" y="0"/>
+                </a:lnTo>
+                <a:lnTo>
+                  <a:pt x="0" y="1189"/>
+                </a:lnTo>
+                <a:lnTo>
+                  <a:pt x="943" y="1189"/>
+                </a:lnTo>
+                <a:lnTo>
+                  <a:pt x="1123" y="1369"/>
+                </a:lnTo>
+                <a:lnTo>
+                  <a:pt x="1123" y="1369"/>
+                </a:lnTo>
+                <a:lnTo>
+                  <a:pt x="1127" y="1371"/>
+                </a:lnTo>
+                <a:lnTo>
+                  <a:pt x="1133" y="1374"/>
+                </a:lnTo>
+                <a:lnTo>
+                  <a:pt x="1139" y="1377"/>
+                </a:lnTo>
+                <a:lnTo>
+                  <a:pt x="1144" y="1377"/>
+                </a:lnTo>
+                <a:lnTo>
+                  <a:pt x="1150" y="1377"/>
+                </a:lnTo>
+                <a:lnTo>
+                  <a:pt x="1155" y="1374"/>
+                </a:lnTo>
+                <a:lnTo>
+                  <a:pt x="1161" y="1371"/>
+                </a:lnTo>
+                <a:lnTo>
+                  <a:pt x="1165" y="1369"/>
+                </a:lnTo>
+                <a:lnTo>
+                  <a:pt x="1345" y="1189"/>
+                </a:lnTo>
+                <a:lnTo>
+                  <a:pt x="5760" y="1189"/>
+                </a:lnTo>
+                <a:lnTo>
+                  <a:pt x="5760" y="0"/>
+                </a:lnTo>
+                <a:close/>
+              </a:path>
+            </a:pathLst>
+          </a:custGeom>
+          <a:ln/>
+          <a:extLst>
+            <a:ext uri="{91240B29-F687-4F45-9708-019B960494DF}">
+              <a14:hiddenLine xmlns:a14="http://schemas.microsoft.com/office/drawing/2010/main" w="9525">
+                <a:solidFill>
+                  <a:srgbClr val="000000"/>
+                </a:solidFill>
+                <a:round/>
+                <a:headEnd/>
+                <a:tailEnd/>
+              </a14:hiddenLine>
+            </a:ext>
+          </a:extLst>
+        </p:spPr>
+        <p:style>
+          <a:lnRef idx="1">
+            <a:schemeClr val="accent1"/>
+          </a:lnRef>
+          <a:fillRef idx="3">
+            <a:schemeClr val="accent1"/>
+          </a:fillRef>
+          <a:effectRef idx="2">
+            <a:schemeClr val="accent1"/>
+          </a:effectRef>
+          <a:fontRef idx="minor">
+            <a:schemeClr val="lt1"/>
+          </a:fontRef>
+        </p:style>
+      </p:sp>
+      <p:sp>
+        <p:nvSpPr>
           <p:cNvPr id="2" name="Title 1"/>
           <p:cNvSpPr>
             <a:spLocks noGrp="1"/>
@@ -1449,7 +3355,7 @@
               <a:rPr lang="en-US" smtClean="0"/>
               <a:t>Click to edit Master title style</a:t>
             </a:r>
-            <a:endParaRPr lang="en-US"/>
+            <a:endParaRPr lang="en-US" dirty="0"/>
           </a:p>
         </p:txBody>
       </p:sp>
@@ -1465,16 +3371,18 @@
         </p:nvSpPr>
         <p:spPr>
           <a:xfrm>
-            <a:off x="457200" y="1535113"/>
-            <a:ext cx="4040188" cy="639762"/>
+            <a:off x="809996" y="2174875"/>
+            <a:ext cx="3670723" cy="576262"/>
           </a:xfrm>
         </p:spPr>
         <p:txBody>
-          <a:bodyPr anchor="b"/>
+          <a:bodyPr anchor="b">
+            <a:noAutofit/>
+          </a:bodyPr>
           <a:lstStyle>
-            <a:lvl1pPr marL="0" indent="0">
-              <a:buNone/>
-              <a:defRPr sz="2400" b="1"/>
+            <a:lvl1pPr marL="0" indent="0" algn="ctr">
+              <a:buNone/>
+              <a:defRPr sz="2000" b="0"/>
             </a:lvl1pPr>
             <a:lvl2pPr marL="457200" indent="0">
               <a:buNone/>
@@ -1530,41 +3438,15 @@
         </p:nvSpPr>
         <p:spPr>
           <a:xfrm>
-            <a:off x="457200" y="2174875"/>
-            <a:ext cx="4040188" cy="3951288"/>
+            <a:off x="809996" y="2751137"/>
+            <a:ext cx="3687391" cy="3109913"/>
           </a:xfrm>
         </p:spPr>
         <p:txBody>
-          <a:bodyPr/>
-          <a:lstStyle>
-            <a:lvl1pPr>
-              <a:defRPr sz="2400"/>
-            </a:lvl1pPr>
-            <a:lvl2pPr>
-              <a:defRPr sz="2000"/>
-            </a:lvl2pPr>
-            <a:lvl3pPr>
-              <a:defRPr sz="1800"/>
-            </a:lvl3pPr>
-            <a:lvl4pPr>
-              <a:defRPr sz="1600"/>
-            </a:lvl4pPr>
-            <a:lvl5pPr>
-              <a:defRPr sz="1600"/>
-            </a:lvl5pPr>
-            <a:lvl6pPr>
-              <a:defRPr sz="1600"/>
-            </a:lvl6pPr>
-            <a:lvl7pPr>
-              <a:defRPr sz="1600"/>
-            </a:lvl7pPr>
-            <a:lvl8pPr>
-              <a:defRPr sz="1600"/>
-            </a:lvl8pPr>
-            <a:lvl9pPr>
-              <a:defRPr sz="1600"/>
-            </a:lvl9pPr>
-          </a:lstStyle>
+          <a:bodyPr anchor="t">
+            <a:normAutofit/>
+          </a:bodyPr>
+          <a:lstStyle/>
           <a:p>
             <a:pPr lvl="0"/>
             <a:r>
@@ -1599,7 +3481,7 @@
               <a:rPr lang="en-US" smtClean="0"/>
               <a:t>Fifth level</a:t>
             </a:r>
-            <a:endParaRPr lang="en-US"/>
+            <a:endParaRPr lang="en-US" dirty="0"/>
           </a:p>
         </p:txBody>
       </p:sp>
@@ -1615,16 +3497,18 @@
         </p:nvSpPr>
         <p:spPr>
           <a:xfrm>
-            <a:off x="4645025" y="1535113"/>
-            <a:ext cx="4041775" cy="639762"/>
+            <a:off x="4663280" y="2174875"/>
+            <a:ext cx="3670720" cy="576262"/>
           </a:xfrm>
         </p:spPr>
         <p:txBody>
-          <a:bodyPr anchor="b"/>
+          <a:bodyPr anchor="b">
+            <a:noAutofit/>
+          </a:bodyPr>
           <a:lstStyle>
-            <a:lvl1pPr marL="0" indent="0">
-              <a:buNone/>
-              <a:defRPr sz="2400" b="1"/>
+            <a:lvl1pPr marL="0" indent="0" algn="ctr">
+              <a:buNone/>
+              <a:defRPr sz="2000" b="0"/>
             </a:lvl1pPr>
             <a:lvl2pPr marL="457200" indent="0">
               <a:buNone/>
@@ -1680,41 +3564,15 @@
         </p:nvSpPr>
         <p:spPr>
           <a:xfrm>
-            <a:off x="4645025" y="2174875"/>
-            <a:ext cx="4041775" cy="3951288"/>
+            <a:off x="4663280" y="2751137"/>
+            <a:ext cx="3670720" cy="3109913"/>
           </a:xfrm>
         </p:spPr>
         <p:txBody>
-          <a:bodyPr/>
-          <a:lstStyle>
-            <a:lvl1pPr>
-              <a:defRPr sz="2400"/>
-            </a:lvl1pPr>
-            <a:lvl2pPr>
-              <a:defRPr sz="2000"/>
-            </a:lvl2pPr>
-            <a:lvl3pPr>
-              <a:defRPr sz="1800"/>
-            </a:lvl3pPr>
-            <a:lvl4pPr>
-              <a:defRPr sz="1600"/>
-            </a:lvl4pPr>
-            <a:lvl5pPr>
-              <a:defRPr sz="1600"/>
-            </a:lvl5pPr>
-            <a:lvl6pPr>
-              <a:defRPr sz="1600"/>
-            </a:lvl6pPr>
-            <a:lvl7pPr>
-              <a:defRPr sz="1600"/>
-            </a:lvl7pPr>
-            <a:lvl8pPr>
-              <a:defRPr sz="1600"/>
-            </a:lvl8pPr>
-            <a:lvl9pPr>
-              <a:defRPr sz="1600"/>
-            </a:lvl9pPr>
-          </a:lstStyle>
+          <a:bodyPr anchor="t">
+            <a:normAutofit/>
+          </a:bodyPr>
+          <a:lstStyle/>
           <a:p>
             <a:pPr lvl="0"/>
             <a:r>
@@ -1749,7 +3607,7 @@
               <a:rPr lang="en-US" smtClean="0"/>
               <a:t>Fifth level</a:t>
             </a:r>
-            <a:endParaRPr lang="en-US"/>
+            <a:endParaRPr lang="en-US" dirty="0"/>
           </a:p>
         </p:txBody>
       </p:sp>
@@ -1821,7 +3679,7 @@
     </p:spTree>
     <p:extLst>
       <p:ext uri="{BB962C8B-B14F-4D97-AF65-F5344CB8AC3E}">
-        <p14:creationId xmlns:p14="http://schemas.microsoft.com/office/powerpoint/2010/main" val="2153347566"/>
+        <p14:creationId xmlns:p14="http://schemas.microsoft.com/office/powerpoint/2010/main" val="1289063964"/>
       </p:ext>
     </p:extLst>
   </p:cSld>
@@ -1850,6 +3708,109 @@
       </p:grpSpPr>
       <p:sp>
         <p:nvSpPr>
+          <p:cNvPr id="6" name="Freeform 6"/>
+          <p:cNvSpPr/>
+          <p:nvPr/>
+        </p:nvSpPr>
+        <p:spPr bwMode="auto">
+          <a:xfrm>
+            <a:off x="0" y="0"/>
+            <a:ext cx="9144000" cy="2185988"/>
+          </a:xfrm>
+          <a:custGeom>
+            <a:avLst/>
+            <a:gdLst/>
+            <a:ahLst/>
+            <a:cxnLst/>
+            <a:rect l="0" t="0" r="r" b="b"/>
+            <a:pathLst>
+              <a:path w="5760" h="1377">
+                <a:moveTo>
+                  <a:pt x="5760" y="0"/>
+                </a:moveTo>
+                <a:lnTo>
+                  <a:pt x="0" y="0"/>
+                </a:lnTo>
+                <a:lnTo>
+                  <a:pt x="0" y="1189"/>
+                </a:lnTo>
+                <a:lnTo>
+                  <a:pt x="943" y="1189"/>
+                </a:lnTo>
+                <a:lnTo>
+                  <a:pt x="1123" y="1369"/>
+                </a:lnTo>
+                <a:lnTo>
+                  <a:pt x="1123" y="1369"/>
+                </a:lnTo>
+                <a:lnTo>
+                  <a:pt x="1127" y="1371"/>
+                </a:lnTo>
+                <a:lnTo>
+                  <a:pt x="1133" y="1374"/>
+                </a:lnTo>
+                <a:lnTo>
+                  <a:pt x="1139" y="1377"/>
+                </a:lnTo>
+                <a:lnTo>
+                  <a:pt x="1144" y="1377"/>
+                </a:lnTo>
+                <a:lnTo>
+                  <a:pt x="1150" y="1377"/>
+                </a:lnTo>
+                <a:lnTo>
+                  <a:pt x="1155" y="1374"/>
+                </a:lnTo>
+                <a:lnTo>
+                  <a:pt x="1161" y="1371"/>
+                </a:lnTo>
+                <a:lnTo>
+                  <a:pt x="1165" y="1369"/>
+                </a:lnTo>
+                <a:lnTo>
+                  <a:pt x="1345" y="1189"/>
+                </a:lnTo>
+                <a:lnTo>
+                  <a:pt x="5760" y="1189"/>
+                </a:lnTo>
+                <a:lnTo>
+                  <a:pt x="5760" y="0"/>
+                </a:lnTo>
+                <a:close/>
+              </a:path>
+            </a:pathLst>
+          </a:custGeom>
+          <a:ln/>
+          <a:extLst>
+            <a:ext uri="{91240B29-F687-4F45-9708-019B960494DF}">
+              <a14:hiddenLine xmlns:a14="http://schemas.microsoft.com/office/drawing/2010/main" w="9525">
+                <a:solidFill>
+                  <a:srgbClr val="000000"/>
+                </a:solidFill>
+                <a:round/>
+                <a:headEnd/>
+                <a:tailEnd/>
+              </a14:hiddenLine>
+            </a:ext>
+          </a:extLst>
+        </p:spPr>
+        <p:style>
+          <a:lnRef idx="1">
+            <a:schemeClr val="accent1"/>
+          </a:lnRef>
+          <a:fillRef idx="3">
+            <a:schemeClr val="accent1"/>
+          </a:fillRef>
+          <a:effectRef idx="2">
+            <a:schemeClr val="accent1"/>
+          </a:effectRef>
+          <a:fontRef idx="minor">
+            <a:schemeClr val="lt1"/>
+          </a:fontRef>
+        </p:style>
+      </p:sp>
+      <p:sp>
+        <p:nvSpPr>
           <p:cNvPr id="2" name="Title 1"/>
           <p:cNvSpPr>
             <a:spLocks noGrp="1"/>
@@ -1867,7 +3828,7 @@
               <a:rPr lang="en-US" smtClean="0"/>
               <a:t>Click to edit Master title style</a:t>
             </a:r>
-            <a:endParaRPr lang="en-US"/>
+            <a:endParaRPr lang="en-US" dirty="0"/>
           </a:p>
         </p:txBody>
       </p:sp>
@@ -1939,7 +3900,7 @@
     </p:spTree>
     <p:extLst>
       <p:ext uri="{BB962C8B-B14F-4D97-AF65-F5344CB8AC3E}">
-        <p14:creationId xmlns:p14="http://schemas.microsoft.com/office/powerpoint/2010/main" val="582818805"/>
+        <p14:creationId xmlns:p14="http://schemas.microsoft.com/office/powerpoint/2010/main" val="1734402509"/>
       </p:ext>
     </p:extLst>
   </p:cSld>
@@ -2034,7 +3995,7 @@
     </p:spTree>
     <p:extLst>
       <p:ext uri="{BB962C8B-B14F-4D97-AF65-F5344CB8AC3E}">
-        <p14:creationId xmlns:p14="http://schemas.microsoft.com/office/powerpoint/2010/main" val="35259465"/>
+        <p14:creationId xmlns:p14="http://schemas.microsoft.com/office/powerpoint/2010/main" val="2526957963"/>
       </p:ext>
     </p:extLst>
   </p:cSld>
@@ -2063,6 +4024,222 @@
       </p:grpSpPr>
       <p:sp>
         <p:nvSpPr>
+          <p:cNvPr id="12" name="Freeform 6"/>
+          <p:cNvSpPr>
+            <a:spLocks noChangeAspect="1"/>
+          </p:cNvSpPr>
+          <p:nvPr/>
+        </p:nvSpPr>
+        <p:spPr bwMode="auto">
+          <a:xfrm>
+            <a:off x="804863" y="446086"/>
+            <a:ext cx="2660650" cy="1814651"/>
+          </a:xfrm>
+          <a:custGeom>
+            <a:avLst/>
+            <a:gdLst/>
+            <a:ahLst/>
+            <a:cxnLst/>
+            <a:rect l="0" t="0" r="r" b="b"/>
+            <a:pathLst>
+              <a:path w="3384" h="2308">
+                <a:moveTo>
+                  <a:pt x="3340" y="0"/>
+                </a:moveTo>
+                <a:lnTo>
+                  <a:pt x="44" y="0"/>
+                </a:lnTo>
+                <a:lnTo>
+                  <a:pt x="44" y="0"/>
+                </a:lnTo>
+                <a:lnTo>
+                  <a:pt x="34" y="0"/>
+                </a:lnTo>
+                <a:lnTo>
+                  <a:pt x="26" y="4"/>
+                </a:lnTo>
+                <a:lnTo>
+                  <a:pt x="20" y="8"/>
+                </a:lnTo>
+                <a:lnTo>
+                  <a:pt x="12" y="12"/>
+                </a:lnTo>
+                <a:lnTo>
+                  <a:pt x="8" y="20"/>
+                </a:lnTo>
+                <a:lnTo>
+                  <a:pt x="4" y="26"/>
+                </a:lnTo>
+                <a:lnTo>
+                  <a:pt x="0" y="34"/>
+                </a:lnTo>
+                <a:lnTo>
+                  <a:pt x="0" y="44"/>
+                </a:lnTo>
+                <a:lnTo>
+                  <a:pt x="0" y="2076"/>
+                </a:lnTo>
+                <a:lnTo>
+                  <a:pt x="0" y="2076"/>
+                </a:lnTo>
+                <a:lnTo>
+                  <a:pt x="0" y="2086"/>
+                </a:lnTo>
+                <a:lnTo>
+                  <a:pt x="4" y="2094"/>
+                </a:lnTo>
+                <a:lnTo>
+                  <a:pt x="8" y="2100"/>
+                </a:lnTo>
+                <a:lnTo>
+                  <a:pt x="12" y="2108"/>
+                </a:lnTo>
+                <a:lnTo>
+                  <a:pt x="20" y="2112"/>
+                </a:lnTo>
+                <a:lnTo>
+                  <a:pt x="26" y="2116"/>
+                </a:lnTo>
+                <a:lnTo>
+                  <a:pt x="34" y="2120"/>
+                </a:lnTo>
+                <a:lnTo>
+                  <a:pt x="44" y="2120"/>
+                </a:lnTo>
+                <a:lnTo>
+                  <a:pt x="474" y="2120"/>
+                </a:lnTo>
+                <a:lnTo>
+                  <a:pt x="650" y="2296"/>
+                </a:lnTo>
+                <a:lnTo>
+                  <a:pt x="650" y="2296"/>
+                </a:lnTo>
+                <a:lnTo>
+                  <a:pt x="656" y="2300"/>
+                </a:lnTo>
+                <a:lnTo>
+                  <a:pt x="664" y="2304"/>
+                </a:lnTo>
+                <a:lnTo>
+                  <a:pt x="672" y="2308"/>
+                </a:lnTo>
+                <a:lnTo>
+                  <a:pt x="680" y="2308"/>
+                </a:lnTo>
+                <a:lnTo>
+                  <a:pt x="688" y="2308"/>
+                </a:lnTo>
+                <a:lnTo>
+                  <a:pt x="696" y="2304"/>
+                </a:lnTo>
+                <a:lnTo>
+                  <a:pt x="704" y="2300"/>
+                </a:lnTo>
+                <a:lnTo>
+                  <a:pt x="710" y="2296"/>
+                </a:lnTo>
+                <a:lnTo>
+                  <a:pt x="886" y="2120"/>
+                </a:lnTo>
+                <a:lnTo>
+                  <a:pt x="3340" y="2120"/>
+                </a:lnTo>
+                <a:lnTo>
+                  <a:pt x="3340" y="2120"/>
+                </a:lnTo>
+                <a:lnTo>
+                  <a:pt x="3350" y="2120"/>
+                </a:lnTo>
+                <a:lnTo>
+                  <a:pt x="3358" y="2116"/>
+                </a:lnTo>
+                <a:lnTo>
+                  <a:pt x="3364" y="2112"/>
+                </a:lnTo>
+                <a:lnTo>
+                  <a:pt x="3372" y="2108"/>
+                </a:lnTo>
+                <a:lnTo>
+                  <a:pt x="3376" y="2100"/>
+                </a:lnTo>
+                <a:lnTo>
+                  <a:pt x="3380" y="2094"/>
+                </a:lnTo>
+                <a:lnTo>
+                  <a:pt x="3384" y="2086"/>
+                </a:lnTo>
+                <a:lnTo>
+                  <a:pt x="3384" y="2076"/>
+                </a:lnTo>
+                <a:lnTo>
+                  <a:pt x="3384" y="44"/>
+                </a:lnTo>
+                <a:lnTo>
+                  <a:pt x="3384" y="44"/>
+                </a:lnTo>
+                <a:lnTo>
+                  <a:pt x="3384" y="34"/>
+                </a:lnTo>
+                <a:lnTo>
+                  <a:pt x="3380" y="26"/>
+                </a:lnTo>
+                <a:lnTo>
+                  <a:pt x="3376" y="20"/>
+                </a:lnTo>
+                <a:lnTo>
+                  <a:pt x="3372" y="12"/>
+                </a:lnTo>
+                <a:lnTo>
+                  <a:pt x="3364" y="8"/>
+                </a:lnTo>
+                <a:lnTo>
+                  <a:pt x="3358" y="4"/>
+                </a:lnTo>
+                <a:lnTo>
+                  <a:pt x="3350" y="0"/>
+                </a:lnTo>
+                <a:lnTo>
+                  <a:pt x="3340" y="0"/>
+                </a:lnTo>
+                <a:lnTo>
+                  <a:pt x="3340" y="0"/>
+                </a:lnTo>
+                <a:close/>
+              </a:path>
+            </a:pathLst>
+          </a:custGeom>
+          <a:ln/>
+          <a:extLst>
+            <a:ext uri="{91240B29-F687-4F45-9708-019B960494DF}">
+              <a14:hiddenLine xmlns:a14="http://schemas.microsoft.com/office/drawing/2010/main" w="9525">
+                <a:solidFill>
+                  <a:srgbClr val="000000"/>
+                </a:solidFill>
+                <a:round/>
+                <a:headEnd/>
+                <a:tailEnd/>
+              </a14:hiddenLine>
+            </a:ext>
+          </a:extLst>
+        </p:spPr>
+        <p:style>
+          <a:lnRef idx="1">
+            <a:schemeClr val="accent1"/>
+          </a:lnRef>
+          <a:fillRef idx="3">
+            <a:schemeClr val="accent1"/>
+          </a:fillRef>
+          <a:effectRef idx="2">
+            <a:schemeClr val="accent1"/>
+          </a:effectRef>
+          <a:fontRef idx="minor">
+            <a:schemeClr val="lt1"/>
+          </a:fontRef>
+        </p:style>
+      </p:sp>
+      <p:sp>
+        <p:nvSpPr>
           <p:cNvPr id="2" name="Title 1"/>
           <p:cNvSpPr>
             <a:spLocks noGrp="1"/>
@@ -2073,8 +4250,8 @@
         </p:nvSpPr>
         <p:spPr>
           <a:xfrm>
-            <a:off x="457200" y="273050"/>
-            <a:ext cx="3008313" cy="1162050"/>
+            <a:off x="804863" y="446088"/>
+            <a:ext cx="2660650" cy="1618396"/>
           </a:xfrm>
         </p:spPr>
         <p:txBody>
@@ -2089,7 +4266,7 @@
               <a:rPr lang="en-US" smtClean="0"/>
               <a:t>Click to edit Master title style</a:t>
             </a:r>
-            <a:endParaRPr lang="en-US"/>
+            <a:endParaRPr lang="en-US" dirty="0"/>
           </a:p>
         </p:txBody>
       </p:sp>
@@ -2105,41 +4282,15 @@
         </p:nvSpPr>
         <p:spPr>
           <a:xfrm>
-            <a:off x="3575050" y="273050"/>
-            <a:ext cx="5111750" cy="5853113"/>
+            <a:off x="3641724" y="446087"/>
+            <a:ext cx="4689475" cy="5414963"/>
           </a:xfrm>
         </p:spPr>
         <p:txBody>
-          <a:bodyPr/>
-          <a:lstStyle>
-            <a:lvl1pPr>
-              <a:defRPr sz="3200"/>
-            </a:lvl1pPr>
-            <a:lvl2pPr>
-              <a:defRPr sz="2800"/>
-            </a:lvl2pPr>
-            <a:lvl3pPr>
-              <a:defRPr sz="2400"/>
-            </a:lvl3pPr>
-            <a:lvl4pPr>
-              <a:defRPr sz="2000"/>
-            </a:lvl4pPr>
-            <a:lvl5pPr>
-              <a:defRPr sz="2000"/>
-            </a:lvl5pPr>
-            <a:lvl6pPr>
-              <a:defRPr sz="2000"/>
-            </a:lvl6pPr>
-            <a:lvl7pPr>
-              <a:defRPr sz="2000"/>
-            </a:lvl7pPr>
-            <a:lvl8pPr>
-              <a:defRPr sz="2000"/>
-            </a:lvl8pPr>
-            <a:lvl9pPr>
-              <a:defRPr sz="2000"/>
-            </a:lvl9pPr>
-          </a:lstStyle>
+          <a:bodyPr>
+            <a:normAutofit/>
+          </a:bodyPr>
+          <a:lstStyle/>
           <a:p>
             <a:pPr lvl="0"/>
             <a:r>
@@ -2174,7 +4325,7 @@
               <a:rPr lang="en-US" smtClean="0"/>
               <a:t>Fifth level</a:t>
             </a:r>
-            <a:endParaRPr lang="en-US"/>
+            <a:endParaRPr lang="en-US" dirty="0"/>
           </a:p>
         </p:txBody>
       </p:sp>
@@ -2190,8 +4341,8 @@
         </p:nvSpPr>
         <p:spPr>
           <a:xfrm>
-            <a:off x="457200" y="1435100"/>
-            <a:ext cx="3008313" cy="4691063"/>
+            <a:off x="804863" y="2260737"/>
+            <a:ext cx="2660650" cy="3600311"/>
           </a:xfrm>
         </p:spPr>
         <p:txBody>
@@ -2311,7 +4462,7 @@
     </p:spTree>
     <p:extLst>
       <p:ext uri="{BB962C8B-B14F-4D97-AF65-F5344CB8AC3E}">
-        <p14:creationId xmlns:p14="http://schemas.microsoft.com/office/powerpoint/2010/main" val="3231045452"/>
+        <p14:creationId xmlns:p14="http://schemas.microsoft.com/office/powerpoint/2010/main" val="2280229640"/>
       </p:ext>
     </p:extLst>
   </p:cSld>
@@ -2350,15 +4501,17 @@
         </p:nvSpPr>
         <p:spPr>
           <a:xfrm>
-            <a:off x="1792288" y="4800600"/>
-            <a:ext cx="5486400" cy="566738"/>
+            <a:off x="809996" y="727521"/>
+            <a:ext cx="3501548" cy="1617163"/>
           </a:xfrm>
         </p:spPr>
         <p:txBody>
-          <a:bodyPr anchor="b"/>
+          <a:bodyPr anchor="b">
+            <a:normAutofit/>
+          </a:bodyPr>
           <a:lstStyle>
             <a:lvl1pPr algn="l">
-              <a:defRPr sz="2000" b="1"/>
+              <a:defRPr sz="2400" b="0"/>
             </a:lvl1pPr>
           </a:lstStyle>
           <a:p>
@@ -2366,93 +4519,146 @@
               <a:rPr lang="en-US" smtClean="0"/>
               <a:t>Click to edit Master title style</a:t>
             </a:r>
-            <a:endParaRPr lang="en-US"/>
-          </a:p>
-        </p:txBody>
-      </p:sp>
-      <p:sp>
-        <p:nvSpPr>
-          <p:cNvPr id="3" name="Picture Placeholder 2"/>
-          <p:cNvSpPr>
-            <a:spLocks noGrp="1"/>
-          </p:cNvSpPr>
-          <p:nvPr>
-            <p:ph type="pic" idx="1"/>
+            <a:endParaRPr lang="en-US" dirty="0"/>
+          </a:p>
+        </p:txBody>
+      </p:sp>
+      <p:sp>
+        <p:nvSpPr>
+          <p:cNvPr id="9" name="Picture Placeholder 11"/>
+          <p:cNvSpPr>
+            <a:spLocks noGrp="1" noChangeAspect="1"/>
+          </p:cNvSpPr>
+          <p:nvPr>
+            <p:ph type="pic" sz="quarter" idx="13"/>
+          </p:nvPr>
+        </p:nvSpPr>
+        <p:spPr bwMode="auto">
+          <a:xfrm>
+            <a:off x="4573588" y="0"/>
+            <a:ext cx="4570412" cy="6858000"/>
+          </a:xfrm>
+          <a:custGeom>
+            <a:avLst/>
+            <a:gdLst/>
+            <a:ahLst/>
+            <a:cxnLst/>
+            <a:rect l="0" t="0" r="r" b="b"/>
+            <a:pathLst>
+              <a:path w="2879" h="4320">
+                <a:moveTo>
+                  <a:pt x="183" y="0"/>
+                </a:moveTo>
+                <a:lnTo>
+                  <a:pt x="183" y="1197"/>
+                </a:lnTo>
+                <a:lnTo>
+                  <a:pt x="8" y="1372"/>
+                </a:lnTo>
+                <a:lnTo>
+                  <a:pt x="8" y="1372"/>
+                </a:lnTo>
+                <a:lnTo>
+                  <a:pt x="6" y="1376"/>
+                </a:lnTo>
+                <a:lnTo>
+                  <a:pt x="3" y="1382"/>
+                </a:lnTo>
+                <a:lnTo>
+                  <a:pt x="0" y="1387"/>
+                </a:lnTo>
+                <a:lnTo>
+                  <a:pt x="0" y="1393"/>
+                </a:lnTo>
+                <a:lnTo>
+                  <a:pt x="0" y="1399"/>
+                </a:lnTo>
+                <a:lnTo>
+                  <a:pt x="3" y="1404"/>
+                </a:lnTo>
+                <a:lnTo>
+                  <a:pt x="6" y="1410"/>
+                </a:lnTo>
+                <a:lnTo>
+                  <a:pt x="8" y="1414"/>
+                </a:lnTo>
+                <a:lnTo>
+                  <a:pt x="183" y="1589"/>
+                </a:lnTo>
+                <a:lnTo>
+                  <a:pt x="183" y="4320"/>
+                </a:lnTo>
+                <a:lnTo>
+                  <a:pt x="2879" y="4320"/>
+                </a:lnTo>
+                <a:lnTo>
+                  <a:pt x="2879" y="0"/>
+                </a:lnTo>
+                <a:lnTo>
+                  <a:pt x="183" y="0"/>
+                </a:lnTo>
+                <a:close/>
+              </a:path>
+            </a:pathLst>
+          </a:custGeom>
+          <a:noFill/>
+          <a:ln w="9525">
+            <a:solidFill>
+              <a:schemeClr val="tx2"/>
+            </a:solidFill>
+            <a:round/>
+            <a:headEnd/>
+            <a:tailEnd/>
+          </a:ln>
+          <a:effectLst/>
+        </p:spPr>
+        <p:txBody>
+          <a:bodyPr wrap="square" numCol="1" anchor="t" anchorCtr="0" compatLnSpc="1">
+            <a:prstTxWarp prst="textNoShape">
+              <a:avLst/>
+            </a:prstTxWarp>
+            <a:normAutofit/>
+          </a:bodyPr>
+          <a:lstStyle>
+            <a:lvl1pPr algn="ctr">
+              <a:buFontTx/>
+              <a:buNone/>
+              <a:defRPr sz="1400"/>
+            </a:lvl1pPr>
+          </a:lstStyle>
+          <a:p>
+            <a:r>
+              <a:rPr lang="en-US" smtClean="0"/>
+              <a:t>Click icon to add picture</a:t>
+            </a:r>
+            <a:endParaRPr lang="en-US" dirty="0"/>
+          </a:p>
+        </p:txBody>
+      </p:sp>
+      <p:sp>
+        <p:nvSpPr>
+          <p:cNvPr id="4" name="Text Placeholder 3"/>
+          <p:cNvSpPr>
+            <a:spLocks noGrp="1"/>
+          </p:cNvSpPr>
+          <p:nvPr>
+            <p:ph type="body" sz="half" idx="2"/>
           </p:nvPr>
         </p:nvSpPr>
         <p:spPr>
           <a:xfrm>
-            <a:off x="1792288" y="612775"/>
-            <a:ext cx="5486400" cy="4114800"/>
+            <a:off x="809996" y="2344684"/>
+            <a:ext cx="3501548" cy="3516365"/>
           </a:xfrm>
         </p:spPr>
         <p:txBody>
-          <a:bodyPr/>
+          <a:bodyPr anchor="t">
+            <a:normAutofit/>
+          </a:bodyPr>
           <a:lstStyle>
             <a:lvl1pPr marL="0" indent="0">
               <a:buNone/>
-              <a:defRPr sz="3200"/>
-            </a:lvl1pPr>
-            <a:lvl2pPr marL="457200" indent="0">
-              <a:buNone/>
-              <a:defRPr sz="2800"/>
-            </a:lvl2pPr>
-            <a:lvl3pPr marL="914400" indent="0">
-              <a:buNone/>
-              <a:defRPr sz="2400"/>
-            </a:lvl3pPr>
-            <a:lvl4pPr marL="1371600" indent="0">
-              <a:buNone/>
-              <a:defRPr sz="2000"/>
-            </a:lvl4pPr>
-            <a:lvl5pPr marL="1828800" indent="0">
-              <a:buNone/>
-              <a:defRPr sz="2000"/>
-            </a:lvl5pPr>
-            <a:lvl6pPr marL="2286000" indent="0">
-              <a:buNone/>
-              <a:defRPr sz="2000"/>
-            </a:lvl6pPr>
-            <a:lvl7pPr marL="2743200" indent="0">
-              <a:buNone/>
-              <a:defRPr sz="2000"/>
-            </a:lvl7pPr>
-            <a:lvl8pPr marL="3200400" indent="0">
-              <a:buNone/>
-              <a:defRPr sz="2000"/>
-            </a:lvl8pPr>
-            <a:lvl9pPr marL="3657600" indent="0">
-              <a:buNone/>
-              <a:defRPr sz="2000"/>
-            </a:lvl9pPr>
-          </a:lstStyle>
-          <a:p>
-            <a:endParaRPr lang="en-US"/>
-          </a:p>
-        </p:txBody>
-      </p:sp>
-      <p:sp>
-        <p:nvSpPr>
-          <p:cNvPr id="4" name="Text Placeholder 3"/>
-          <p:cNvSpPr>
-            <a:spLocks noGrp="1"/>
-          </p:cNvSpPr>
-          <p:nvPr>
-            <p:ph type="body" sz="half" idx="2"/>
-          </p:nvPr>
-        </p:nvSpPr>
-        <p:spPr>
-          <a:xfrm>
-            <a:off x="1792288" y="5367338"/>
-            <a:ext cx="5486400" cy="804862"/>
-          </a:xfrm>
-        </p:spPr>
-        <p:txBody>
-          <a:bodyPr/>
-          <a:lstStyle>
-            <a:lvl1pPr marL="0" indent="0">
-              <a:buNone/>
-              <a:defRPr sz="1400"/>
+              <a:defRPr sz="1200"/>
             </a:lvl1pPr>
             <a:lvl2pPr marL="457200" indent="0">
               <a:buNone/>
@@ -2506,7 +4712,12 @@
             <p:ph type="dt" sz="half" idx="10"/>
           </p:nvPr>
         </p:nvSpPr>
-        <p:spPr/>
+        <p:spPr>
+          <a:xfrm>
+            <a:off x="2914357" y="6041361"/>
+            <a:ext cx="732659" cy="365125"/>
+          </a:xfrm>
+        </p:spPr>
         <p:txBody>
           <a:bodyPr/>
           <a:lstStyle/>
@@ -2529,7 +4740,12 @@
             <p:ph type="ftr" sz="quarter" idx="11"/>
           </p:nvPr>
         </p:nvSpPr>
-        <p:spPr/>
+        <p:spPr>
+          <a:xfrm>
+            <a:off x="442797" y="6041361"/>
+            <a:ext cx="2471560" cy="365125"/>
+          </a:xfrm>
+        </p:spPr>
         <p:txBody>
           <a:bodyPr/>
           <a:lstStyle/>
@@ -2548,7 +4764,12 @@
             <p:ph type="sldNum" sz="quarter" idx="12"/>
           </p:nvPr>
         </p:nvSpPr>
-        <p:spPr/>
+        <p:spPr>
+          <a:xfrm>
+            <a:off x="3647017" y="5915887"/>
+            <a:ext cx="796616" cy="490599"/>
+          </a:xfrm>
+        </p:spPr>
         <p:txBody>
           <a:bodyPr/>
           <a:lstStyle/>
@@ -2564,7 +4785,7 @@
     </p:spTree>
     <p:extLst>
       <p:ext uri="{BB962C8B-B14F-4D97-AF65-F5344CB8AC3E}">
-        <p14:creationId xmlns:p14="http://schemas.microsoft.com/office/powerpoint/2010/main" val="3644576146"/>
+        <p14:creationId xmlns:p14="http://schemas.microsoft.com/office/powerpoint/2010/main" val="449502100"/>
       </p:ext>
     </p:extLst>
   </p:cSld>
@@ -2579,7 +4800,7 @@
   <p:cSld>
     <p:bg>
       <p:bgRef idx="1001">
-        <a:schemeClr val="bg1"/>
+        <a:schemeClr val="bg2"/>
       </p:bgRef>
     </p:bg>
     <p:spTree>
@@ -2608,200 +4829,208 @@
         </p:nvSpPr>
         <p:spPr>
           <a:xfrm>
-            <a:off x="457200" y="274638"/>
-            <a:ext cx="8229600" cy="1143000"/>
+            <a:off x="809997" y="447188"/>
+            <a:ext cx="7524003" cy="970450"/>
+          </a:xfrm>
+          <a:prstGeom prst="rect">
+            <a:avLst/>
+          </a:prstGeom>
+          <a:effectLst>
+            <a:outerShdw blurRad="50800" dir="14400000">
+              <a:srgbClr val="000000">
+                <a:alpha val="60000"/>
+              </a:srgbClr>
+            </a:outerShdw>
+          </a:effectLst>
+        </p:spPr>
+        <p:txBody>
+          <a:bodyPr vert="horz" lIns="91440" tIns="45720" rIns="91440" bIns="45720" rtlCol="0" anchor="b">
+            <a:noAutofit/>
+          </a:bodyPr>
+          <a:lstStyle/>
+          <a:p>
+            <a:r>
+              <a:rPr lang="en-US" smtClean="0"/>
+              <a:t>Click to edit Master title style</a:t>
+            </a:r>
+            <a:endParaRPr lang="en-US" dirty="0"/>
+          </a:p>
+        </p:txBody>
+      </p:sp>
+      <p:sp>
+        <p:nvSpPr>
+          <p:cNvPr id="3" name="Text Placeholder 2"/>
+          <p:cNvSpPr>
+            <a:spLocks noGrp="1"/>
+          </p:cNvSpPr>
+          <p:nvPr>
+            <p:ph type="body" idx="1"/>
+          </p:nvPr>
+        </p:nvSpPr>
+        <p:spPr>
+          <a:xfrm>
+            <a:off x="809997" y="2184400"/>
+            <a:ext cx="7524003" cy="3674397"/>
+          </a:xfrm>
+          <a:prstGeom prst="rect">
+            <a:avLst/>
+          </a:prstGeom>
+          <a:effectLst>
+            <a:outerShdw blurRad="50800" dir="14400000">
+              <a:srgbClr val="000000">
+                <a:alpha val="40000"/>
+              </a:srgbClr>
+            </a:outerShdw>
+          </a:effectLst>
+        </p:spPr>
+        <p:txBody>
+          <a:bodyPr vert="horz" lIns="91440" tIns="45720" rIns="91440" bIns="45720" rtlCol="0" anchor="ctr">
+            <a:normAutofit/>
+          </a:bodyPr>
+          <a:lstStyle/>
+          <a:p>
+            <a:pPr lvl="0"/>
+            <a:r>
+              <a:rPr lang="en-US" smtClean="0"/>
+              <a:t>Click to edit Master text styles</a:t>
+            </a:r>
+          </a:p>
+          <a:p>
+            <a:pPr lvl="1"/>
+            <a:r>
+              <a:rPr lang="en-US" smtClean="0"/>
+              <a:t>Second level</a:t>
+            </a:r>
+          </a:p>
+          <a:p>
+            <a:pPr lvl="2"/>
+            <a:r>
+              <a:rPr lang="en-US" smtClean="0"/>
+              <a:t>Third level</a:t>
+            </a:r>
+          </a:p>
+          <a:p>
+            <a:pPr lvl="3"/>
+            <a:r>
+              <a:rPr lang="en-US" smtClean="0"/>
+              <a:t>Fourth level</a:t>
+            </a:r>
+          </a:p>
+          <a:p>
+            <a:pPr lvl="4"/>
+            <a:r>
+              <a:rPr lang="en-US" smtClean="0"/>
+              <a:t>Fifth level</a:t>
+            </a:r>
+            <a:endParaRPr lang="en-US" dirty="0"/>
+          </a:p>
+        </p:txBody>
+      </p:sp>
+      <p:sp>
+        <p:nvSpPr>
+          <p:cNvPr id="5" name="Footer Placeholder 4"/>
+          <p:cNvSpPr>
+            <a:spLocks noGrp="1"/>
+          </p:cNvSpPr>
+          <p:nvPr>
+            <p:ph type="ftr" sz="quarter" idx="3"/>
+          </p:nvPr>
+        </p:nvSpPr>
+        <p:spPr>
+          <a:xfrm>
+            <a:off x="442797" y="6041361"/>
+            <a:ext cx="6289532" cy="365125"/>
           </a:xfrm>
           <a:prstGeom prst="rect">
             <a:avLst/>
           </a:prstGeom>
         </p:spPr>
         <p:txBody>
-          <a:bodyPr vert="horz" lIns="91440" tIns="45720" rIns="91440" bIns="45720" rtlCol="0" anchor="ctr">
-            <a:normAutofit/>
-          </a:bodyPr>
-          <a:lstStyle/>
-          <a:p>
-            <a:r>
-              <a:rPr lang="en-US" smtClean="0"/>
-              <a:t>Click to edit Master title style</a:t>
-            </a:r>
+          <a:bodyPr vert="horz" lIns="91440" tIns="45720" rIns="91440" bIns="45720" rtlCol="0" anchor="b"/>
+          <a:lstStyle>
+            <a:lvl1pPr algn="l">
+              <a:defRPr sz="900">
+                <a:solidFill>
+                  <a:schemeClr val="tx1"/>
+                </a:solidFill>
+              </a:defRPr>
+            </a:lvl1pPr>
+          </a:lstStyle>
+          <a:p>
             <a:endParaRPr lang="en-US"/>
           </a:p>
         </p:txBody>
       </p:sp>
       <p:sp>
         <p:nvSpPr>
-          <p:cNvPr id="3" name="Text Placeholder 2"/>
-          <p:cNvSpPr>
-            <a:spLocks noGrp="1"/>
-          </p:cNvSpPr>
-          <p:nvPr>
-            <p:ph type="body" idx="1"/>
+          <p:cNvPr id="4" name="Date Placeholder 3"/>
+          <p:cNvSpPr>
+            <a:spLocks noGrp="1"/>
+          </p:cNvSpPr>
+          <p:nvPr>
+            <p:ph type="dt" sz="half" idx="2"/>
           </p:nvPr>
         </p:nvSpPr>
         <p:spPr>
           <a:xfrm>
-            <a:off x="457200" y="1600200"/>
-            <a:ext cx="8229600" cy="4525963"/>
+            <a:off x="6911422" y="6041361"/>
+            <a:ext cx="993161" cy="365125"/>
           </a:xfrm>
           <a:prstGeom prst="rect">
             <a:avLst/>
           </a:prstGeom>
         </p:spPr>
         <p:txBody>
-          <a:bodyPr vert="horz" lIns="91440" tIns="45720" rIns="91440" bIns="45720" rtlCol="0">
-            <a:normAutofit/>
-          </a:bodyPr>
-          <a:lstStyle/>
-          <a:p>
-            <a:pPr lvl="0"/>
-            <a:r>
-              <a:rPr lang="en-US" smtClean="0"/>
-              <a:t>Click to edit Master text styles</a:t>
-            </a:r>
-          </a:p>
-          <a:p>
-            <a:pPr lvl="1"/>
-            <a:r>
-              <a:rPr lang="en-US" smtClean="0"/>
-              <a:t>Second level</a:t>
-            </a:r>
-          </a:p>
-          <a:p>
-            <a:pPr lvl="2"/>
-            <a:r>
-              <a:rPr lang="en-US" smtClean="0"/>
-              <a:t>Third level</a:t>
-            </a:r>
-          </a:p>
-          <a:p>
-            <a:pPr lvl="3"/>
-            <a:r>
-              <a:rPr lang="en-US" smtClean="0"/>
-              <a:t>Fourth level</a:t>
-            </a:r>
-          </a:p>
-          <a:p>
-            <a:pPr lvl="4"/>
-            <a:r>
-              <a:rPr lang="en-US" smtClean="0"/>
-              <a:t>Fifth level</a:t>
-            </a:r>
+          <a:bodyPr vert="horz" lIns="91440" tIns="45720" rIns="91440" bIns="45720" rtlCol="0" anchor="b"/>
+          <a:lstStyle>
+            <a:lvl1pPr algn="r">
+              <a:defRPr sz="900">
+                <a:solidFill>
+                  <a:schemeClr val="tx1"/>
+                </a:solidFill>
+              </a:defRPr>
+            </a:lvl1pPr>
+          </a:lstStyle>
+          <a:p>
+            <a:fld id="{A0EB2B84-A710-4304-A084-3986FE04F79C}" type="datetimeFigureOut">
+              <a:rPr lang="en-US" smtClean="0"/>
+              <a:t>12/9/2015</a:t>
+            </a:fld>
             <a:endParaRPr lang="en-US"/>
           </a:p>
         </p:txBody>
       </p:sp>
       <p:sp>
         <p:nvSpPr>
-          <p:cNvPr id="4" name="Date Placeholder 3"/>
-          <p:cNvSpPr>
-            <a:spLocks noGrp="1"/>
-          </p:cNvSpPr>
-          <p:nvPr>
-            <p:ph type="dt" sz="half" idx="2"/>
+          <p:cNvPr id="6" name="Slide Number Placeholder 5"/>
+          <p:cNvSpPr>
+            <a:spLocks noGrp="1"/>
+          </p:cNvSpPr>
+          <p:nvPr>
+            <p:ph type="sldNum" sz="quarter" idx="4"/>
           </p:nvPr>
         </p:nvSpPr>
         <p:spPr>
           <a:xfrm>
-            <a:off x="457200" y="6356350"/>
-            <a:ext cx="2133600" cy="365125"/>
+            <a:off x="7904584" y="5915887"/>
+            <a:ext cx="796616" cy="490599"/>
           </a:xfrm>
           <a:prstGeom prst="rect">
             <a:avLst/>
           </a:prstGeom>
         </p:spPr>
         <p:txBody>
-          <a:bodyPr vert="horz" lIns="91440" tIns="45720" rIns="91440" bIns="45720" rtlCol="0" anchor="ctr"/>
+          <a:bodyPr vert="horz" lIns="91440" tIns="45720" rIns="91440" bIns="10800" rtlCol="0" anchor="b"/>
           <a:lstStyle>
-            <a:lvl1pPr algn="l">
-              <a:defRPr sz="1200">
+            <a:lvl1pPr algn="r">
+              <a:defRPr sz="2000">
                 <a:solidFill>
-                  <a:schemeClr val="tx1">
-                    <a:tint val="75000"/>
-                  </a:schemeClr>
+                  <a:schemeClr val="accent1"/>
                 </a:solidFill>
               </a:defRPr>
             </a:lvl1pPr>
           </a:lstStyle>
           <a:p>
-            <a:fld id="{A0EB2B84-A710-4304-A084-3986FE04F79C}" type="datetimeFigureOut">
-              <a:rPr lang="en-US" smtClean="0"/>
-              <a:t>12/9/2015</a:t>
-            </a:fld>
-            <a:endParaRPr lang="en-US"/>
-          </a:p>
-        </p:txBody>
-      </p:sp>
-      <p:sp>
-        <p:nvSpPr>
-          <p:cNvPr id="5" name="Footer Placeholder 4"/>
-          <p:cNvSpPr>
-            <a:spLocks noGrp="1"/>
-          </p:cNvSpPr>
-          <p:nvPr>
-            <p:ph type="ftr" sz="quarter" idx="3"/>
-          </p:nvPr>
-        </p:nvSpPr>
-        <p:spPr>
-          <a:xfrm>
-            <a:off x="3124200" y="6356350"/>
-            <a:ext cx="2895600" cy="365125"/>
-          </a:xfrm>
-          <a:prstGeom prst="rect">
-            <a:avLst/>
-          </a:prstGeom>
-        </p:spPr>
-        <p:txBody>
-          <a:bodyPr vert="horz" lIns="91440" tIns="45720" rIns="91440" bIns="45720" rtlCol="0" anchor="ctr"/>
-          <a:lstStyle>
-            <a:lvl1pPr algn="ctr">
-              <a:defRPr sz="1200">
-                <a:solidFill>
-                  <a:schemeClr val="tx1">
-                    <a:tint val="75000"/>
-                  </a:schemeClr>
-                </a:solidFill>
-              </a:defRPr>
-            </a:lvl1pPr>
-          </a:lstStyle>
-          <a:p>
-            <a:endParaRPr lang="en-US"/>
-          </a:p>
-        </p:txBody>
-      </p:sp>
-      <p:sp>
-        <p:nvSpPr>
-          <p:cNvPr id="6" name="Slide Number Placeholder 5"/>
-          <p:cNvSpPr>
-            <a:spLocks noGrp="1"/>
-          </p:cNvSpPr>
-          <p:nvPr>
-            <p:ph type="sldNum" sz="quarter" idx="4"/>
-          </p:nvPr>
-        </p:nvSpPr>
-        <p:spPr>
-          <a:xfrm>
-            <a:off x="6553200" y="6356350"/>
-            <a:ext cx="2133600" cy="365125"/>
-          </a:xfrm>
-          <a:prstGeom prst="rect">
-            <a:avLst/>
-          </a:prstGeom>
-        </p:spPr>
-        <p:txBody>
-          <a:bodyPr vert="horz" lIns="91440" tIns="45720" rIns="91440" bIns="45720" rtlCol="0" anchor="ctr"/>
-          <a:lstStyle>
-            <a:lvl1pPr algn="r">
-              <a:defRPr sz="1200">
-                <a:solidFill>
-                  <a:schemeClr val="tx1">
-                    <a:tint val="75000"/>
-                  </a:schemeClr>
-                </a:solidFill>
-              </a:defRPr>
-            </a:lvl1pPr>
-          </a:lstStyle>
-          <a:p>
             <a:fld id="{484A773A-47B9-4117-9E98-033583F0143E}" type="slidenum">
               <a:rPr lang="en-US" smtClean="0"/>
               <a:t>‹#›</a:t>
@@ -2813,49 +5042,114 @@
     </p:spTree>
     <p:extLst>
       <p:ext uri="{BB962C8B-B14F-4D97-AF65-F5344CB8AC3E}">
-        <p14:creationId xmlns:p14="http://schemas.microsoft.com/office/powerpoint/2010/main" val="2332684410"/>
+        <p14:creationId xmlns:p14="http://schemas.microsoft.com/office/powerpoint/2010/main" val="1379907213"/>
       </p:ext>
     </p:extLst>
   </p:cSld>
-  <p:clrMap bg1="lt1" tx1="dk1" bg2="lt2" tx2="dk2" accent1="accent1" accent2="accent2" accent3="accent3" accent4="accent4" accent5="accent5" accent6="accent6" hlink="hlink" folHlink="folHlink"/>
+  <p:clrMap bg1="dk1" tx1="lt1" bg2="dk2" tx2="lt2" accent1="accent1" accent2="accent2" accent3="accent3" accent4="accent4" accent5="accent5" accent6="accent6" hlink="hlink" folHlink="folHlink"/>
   <p:sldLayoutIdLst>
-    <p:sldLayoutId id="2147483649" r:id="rId1"/>
-    <p:sldLayoutId id="2147483650" r:id="rId2"/>
-    <p:sldLayoutId id="2147483651" r:id="rId3"/>
-    <p:sldLayoutId id="2147483652" r:id="rId4"/>
-    <p:sldLayoutId id="2147483653" r:id="rId5"/>
-    <p:sldLayoutId id="2147483654" r:id="rId6"/>
-    <p:sldLayoutId id="2147483655" r:id="rId7"/>
-    <p:sldLayoutId id="2147483656" r:id="rId8"/>
-    <p:sldLayoutId id="2147483657" r:id="rId9"/>
-    <p:sldLayoutId id="2147483658" r:id="rId10"/>
-    <p:sldLayoutId id="2147483659" r:id="rId11"/>
+    <p:sldLayoutId id="2147483799" r:id="rId1"/>
+    <p:sldLayoutId id="2147483800" r:id="rId2"/>
+    <p:sldLayoutId id="2147483801" r:id="rId3"/>
+    <p:sldLayoutId id="2147483802" r:id="rId4"/>
+    <p:sldLayoutId id="2147483803" r:id="rId5"/>
+    <p:sldLayoutId id="2147483804" r:id="rId6"/>
+    <p:sldLayoutId id="2147483805" r:id="rId7"/>
+    <p:sldLayoutId id="2147483806" r:id="rId8"/>
+    <p:sldLayoutId id="2147483807" r:id="rId9"/>
+    <p:sldLayoutId id="2147483808" r:id="rId10"/>
+    <p:sldLayoutId id="2147483809" r:id="rId11"/>
+    <p:sldLayoutId id="2147483810" r:id="rId12"/>
+    <p:sldLayoutId id="2147483811" r:id="rId13"/>
+    <p:sldLayoutId id="2147483812" r:id="rId14"/>
   </p:sldLayoutIdLst>
   <p:txStyles>
     <p:titleStyle>
-      <a:lvl1pPr algn="ctr" defTabSz="914400" rtl="0" eaLnBrk="1" latinLnBrk="0" hangingPunct="1">
+      <a:lvl1pPr algn="l" defTabSz="457200" rtl="0" eaLnBrk="1" latinLnBrk="0" hangingPunct="1">
         <a:spcBef>
           <a:spcPct val="0"/>
         </a:spcBef>
         <a:buNone/>
-        <a:defRPr sz="4400" kern="1200">
+        <a:defRPr sz="4000" b="1" kern="1200">
           <a:solidFill>
-            <a:schemeClr val="tx1"/>
+            <a:srgbClr val="FEFEFE"/>
           </a:solidFill>
           <a:latin typeface="+mj-lt"/>
           <a:ea typeface="+mj-ea"/>
-          <a:cs typeface="+mj-cs"/>
+          <a:cs typeface="Trebuchet MS"/>
         </a:defRPr>
       </a:lvl1pPr>
+      <a:lvl2pPr eaLnBrk="1" hangingPunct="1">
+        <a:defRPr>
+          <a:solidFill>
+            <a:schemeClr val="tx2"/>
+          </a:solidFill>
+        </a:defRPr>
+      </a:lvl2pPr>
+      <a:lvl3pPr eaLnBrk="1" hangingPunct="1">
+        <a:defRPr>
+          <a:solidFill>
+            <a:schemeClr val="tx2"/>
+          </a:solidFill>
+        </a:defRPr>
+      </a:lvl3pPr>
+      <a:lvl4pPr eaLnBrk="1" hangingPunct="1">
+        <a:defRPr>
+          <a:solidFill>
+            <a:schemeClr val="tx2"/>
+          </a:solidFill>
+        </a:defRPr>
+      </a:lvl4pPr>
+      <a:lvl5pPr eaLnBrk="1" hangingPunct="1">
+        <a:defRPr>
+          <a:solidFill>
+            <a:schemeClr val="tx2"/>
+          </a:solidFill>
+        </a:defRPr>
+      </a:lvl5pPr>
+      <a:lvl6pPr eaLnBrk="1" hangingPunct="1">
+        <a:defRPr>
+          <a:solidFill>
+            <a:schemeClr val="tx2"/>
+          </a:solidFill>
+        </a:defRPr>
+      </a:lvl6pPr>
+      <a:lvl7pPr eaLnBrk="1" hangingPunct="1">
+        <a:defRPr>
+          <a:solidFill>
+            <a:schemeClr val="tx2"/>
+          </a:solidFill>
+        </a:defRPr>
+      </a:lvl7pPr>
+      <a:lvl8pPr eaLnBrk="1" hangingPunct="1">
+        <a:defRPr>
+          <a:solidFill>
+            <a:schemeClr val="tx2"/>
+          </a:solidFill>
+        </a:defRPr>
+      </a:lvl8pPr>
+      <a:lvl9pPr eaLnBrk="1" hangingPunct="1">
+        <a:defRPr>
+          <a:solidFill>
+            <a:schemeClr val="tx2"/>
+          </a:solidFill>
+        </a:defRPr>
+      </a:lvl9pPr>
     </p:titleStyle>
     <p:bodyStyle>
-      <a:lvl1pPr marL="342900" indent="-342900" algn="l" defTabSz="914400" rtl="0" eaLnBrk="1" latinLnBrk="0" hangingPunct="1">
+      <a:lvl1pPr marL="342900" indent="-342900" algn="l" defTabSz="457200" rtl="0" eaLnBrk="1" latinLnBrk="0" hangingPunct="1">
         <a:spcBef>
           <a:spcPct val="20000"/>
         </a:spcBef>
-        <a:buFont typeface="Arial" panose="020B0604020202020204" pitchFamily="34" charset="0"/>
-        <a:buChar char="•"/>
-        <a:defRPr sz="3200" kern="1200">
+        <a:spcAft>
+          <a:spcPts val="600"/>
+        </a:spcAft>
+        <a:buClr>
+          <a:schemeClr val="accent1"/>
+        </a:buClr>
+        <a:buFont typeface="Wingdings 2" charset="2"/>
+        <a:buChar char=""/>
+        <a:defRPr sz="1800" kern="1200">
           <a:solidFill>
             <a:schemeClr val="tx1"/>
           </a:solidFill>
@@ -2864,13 +5158,19 @@
           <a:cs typeface="+mn-cs"/>
         </a:defRPr>
       </a:lvl1pPr>
-      <a:lvl2pPr marL="742950" indent="-285750" algn="l" defTabSz="914400" rtl="0" eaLnBrk="1" latinLnBrk="0" hangingPunct="1">
+      <a:lvl2pPr marL="742950" indent="-285750" algn="l" defTabSz="457200" rtl="0" eaLnBrk="1" latinLnBrk="0" hangingPunct="1">
         <a:spcBef>
           <a:spcPct val="20000"/>
         </a:spcBef>
-        <a:buFont typeface="Arial" panose="020B0604020202020204" pitchFamily="34" charset="0"/>
-        <a:buChar char="–"/>
-        <a:defRPr sz="2800" kern="1200">
+        <a:spcAft>
+          <a:spcPts val="600"/>
+        </a:spcAft>
+        <a:buClr>
+          <a:schemeClr val="accent1"/>
+        </a:buClr>
+        <a:buFont typeface="Wingdings 2" charset="2"/>
+        <a:buChar char=""/>
+        <a:defRPr sz="1600" kern="1200">
           <a:solidFill>
             <a:schemeClr val="tx1"/>
           </a:solidFill>
@@ -2879,13 +5179,19 @@
           <a:cs typeface="+mn-cs"/>
         </a:defRPr>
       </a:lvl2pPr>
-      <a:lvl3pPr marL="1143000" indent="-228600" algn="l" defTabSz="914400" rtl="0" eaLnBrk="1" latinLnBrk="0" hangingPunct="1">
+      <a:lvl3pPr marL="1143000" indent="-228600" algn="l" defTabSz="457200" rtl="0" eaLnBrk="1" latinLnBrk="0" hangingPunct="1">
         <a:spcBef>
           <a:spcPct val="20000"/>
         </a:spcBef>
-        <a:buFont typeface="Arial" panose="020B0604020202020204" pitchFamily="34" charset="0"/>
-        <a:buChar char="•"/>
-        <a:defRPr sz="2400" kern="1200">
+        <a:spcAft>
+          <a:spcPts val="600"/>
+        </a:spcAft>
+        <a:buClr>
+          <a:schemeClr val="accent1"/>
+        </a:buClr>
+        <a:buFont typeface="Wingdings 2" charset="2"/>
+        <a:buChar char=""/>
+        <a:defRPr sz="1400" kern="1200">
           <a:solidFill>
             <a:schemeClr val="tx1"/>
           </a:solidFill>
@@ -2894,13 +5200,19 @@
           <a:cs typeface="+mn-cs"/>
         </a:defRPr>
       </a:lvl3pPr>
-      <a:lvl4pPr marL="1600200" indent="-228600" algn="l" defTabSz="914400" rtl="0" eaLnBrk="1" latinLnBrk="0" hangingPunct="1">
+      <a:lvl4pPr marL="1600200" indent="-228600" algn="l" defTabSz="457200" rtl="0" eaLnBrk="1" latinLnBrk="0" hangingPunct="1">
         <a:spcBef>
           <a:spcPct val="20000"/>
         </a:spcBef>
-        <a:buFont typeface="Arial" panose="020B0604020202020204" pitchFamily="34" charset="0"/>
-        <a:buChar char="–"/>
-        <a:defRPr sz="2000" kern="1200">
+        <a:spcAft>
+          <a:spcPts val="600"/>
+        </a:spcAft>
+        <a:buClr>
+          <a:schemeClr val="accent1"/>
+        </a:buClr>
+        <a:buFont typeface="Wingdings 2" charset="2"/>
+        <a:buChar char=""/>
+        <a:defRPr sz="1200" kern="1200">
           <a:solidFill>
             <a:schemeClr val="tx1"/>
           </a:solidFill>
@@ -2909,13 +5221,19 @@
           <a:cs typeface="+mn-cs"/>
         </a:defRPr>
       </a:lvl4pPr>
-      <a:lvl5pPr marL="2057400" indent="-228600" algn="l" defTabSz="914400" rtl="0" eaLnBrk="1" latinLnBrk="0" hangingPunct="1">
+      <a:lvl5pPr marL="2057400" indent="-228600" algn="l" defTabSz="457200" rtl="0" eaLnBrk="1" latinLnBrk="0" hangingPunct="1">
         <a:spcBef>
           <a:spcPct val="20000"/>
         </a:spcBef>
-        <a:buFont typeface="Arial" panose="020B0604020202020204" pitchFamily="34" charset="0"/>
-        <a:buChar char="»"/>
-        <a:defRPr sz="2000" kern="1200">
+        <a:spcAft>
+          <a:spcPts val="600"/>
+        </a:spcAft>
+        <a:buClr>
+          <a:schemeClr val="accent1"/>
+        </a:buClr>
+        <a:buFont typeface="Wingdings 2" charset="2"/>
+        <a:buChar char=""/>
+        <a:defRPr sz="1200" kern="1200">
           <a:solidFill>
             <a:schemeClr val="tx1"/>
           </a:solidFill>
@@ -2924,13 +5242,19 @@
           <a:cs typeface="+mn-cs"/>
         </a:defRPr>
       </a:lvl5pPr>
-      <a:lvl6pPr marL="2514600" indent="-228600" algn="l" defTabSz="914400" rtl="0" eaLnBrk="1" latinLnBrk="0" hangingPunct="1">
+      <a:lvl6pPr marL="2400000" indent="-228600" algn="l" defTabSz="457200" rtl="0" eaLnBrk="1" latinLnBrk="0" hangingPunct="1">
         <a:spcBef>
           <a:spcPct val="20000"/>
         </a:spcBef>
-        <a:buFont typeface="Arial" panose="020B0604020202020204" pitchFamily="34" charset="0"/>
-        <a:buChar char="•"/>
-        <a:defRPr sz="2000" kern="1200">
+        <a:spcAft>
+          <a:spcPts val="600"/>
+        </a:spcAft>
+        <a:buClr>
+          <a:schemeClr val="accent1"/>
+        </a:buClr>
+        <a:buFont typeface="Wingdings 2" charset="2"/>
+        <a:buChar char=""/>
+        <a:defRPr sz="1200" kern="1200">
           <a:solidFill>
             <a:schemeClr val="tx1"/>
           </a:solidFill>
@@ -2939,13 +5263,19 @@
           <a:cs typeface="+mn-cs"/>
         </a:defRPr>
       </a:lvl6pPr>
-      <a:lvl7pPr marL="2971800" indent="-228600" algn="l" defTabSz="914400" rtl="0" eaLnBrk="1" latinLnBrk="0" hangingPunct="1">
+      <a:lvl7pPr marL="2800000" indent="-228600" algn="l" defTabSz="457200" rtl="0" eaLnBrk="1" latinLnBrk="0" hangingPunct="1">
         <a:spcBef>
           <a:spcPct val="20000"/>
         </a:spcBef>
-        <a:buFont typeface="Arial" panose="020B0604020202020204" pitchFamily="34" charset="0"/>
-        <a:buChar char="•"/>
-        <a:defRPr sz="2000" kern="1200">
+        <a:spcAft>
+          <a:spcPts val="600"/>
+        </a:spcAft>
+        <a:buClr>
+          <a:schemeClr val="accent1"/>
+        </a:buClr>
+        <a:buFont typeface="Wingdings 2" charset="2"/>
+        <a:buChar char=""/>
+        <a:defRPr sz="1200" kern="1200">
           <a:solidFill>
             <a:schemeClr val="tx1"/>
           </a:solidFill>
@@ -2954,13 +5284,19 @@
           <a:cs typeface="+mn-cs"/>
         </a:defRPr>
       </a:lvl7pPr>
-      <a:lvl8pPr marL="3429000" indent="-228600" algn="l" defTabSz="914400" rtl="0" eaLnBrk="1" latinLnBrk="0" hangingPunct="1">
+      <a:lvl8pPr marL="3200000" indent="-228600" algn="l" defTabSz="457200" rtl="0" eaLnBrk="1" latinLnBrk="0" hangingPunct="1">
         <a:spcBef>
           <a:spcPct val="20000"/>
         </a:spcBef>
-        <a:buFont typeface="Arial" panose="020B0604020202020204" pitchFamily="34" charset="0"/>
-        <a:buChar char="•"/>
-        <a:defRPr sz="2000" kern="1200">
+        <a:spcAft>
+          <a:spcPts val="600"/>
+        </a:spcAft>
+        <a:buClr>
+          <a:schemeClr val="accent1"/>
+        </a:buClr>
+        <a:buFont typeface="Wingdings 2" charset="2"/>
+        <a:buChar char=""/>
+        <a:defRPr sz="1200" kern="1200">
           <a:solidFill>
             <a:schemeClr val="tx1"/>
           </a:solidFill>
@@ -2969,13 +5305,19 @@
           <a:cs typeface="+mn-cs"/>
         </a:defRPr>
       </a:lvl8pPr>
-      <a:lvl9pPr marL="3886200" indent="-228600" algn="l" defTabSz="914400" rtl="0" eaLnBrk="1" latinLnBrk="0" hangingPunct="1">
+      <a:lvl9pPr marL="3600000" indent="-228600" algn="l" defTabSz="457200" rtl="0" eaLnBrk="1" latinLnBrk="0" hangingPunct="1">
         <a:spcBef>
           <a:spcPct val="20000"/>
         </a:spcBef>
-        <a:buFont typeface="Arial" panose="020B0604020202020204" pitchFamily="34" charset="0"/>
-        <a:buChar char="•"/>
-        <a:defRPr sz="2000" kern="1200">
+        <a:spcAft>
+          <a:spcPts val="600"/>
+        </a:spcAft>
+        <a:buClr>
+          <a:schemeClr val="accent1"/>
+        </a:buClr>
+        <a:buFont typeface="Wingdings 2" charset="2"/>
+        <a:buChar char=""/>
+        <a:defRPr sz="1200" kern="1200">
           <a:solidFill>
             <a:schemeClr val="tx1"/>
           </a:solidFill>
@@ -2989,7 +5331,7 @@
       <a:defPPr>
         <a:defRPr lang="en-US"/>
       </a:defPPr>
-      <a:lvl1pPr marL="0" algn="l" defTabSz="914400" rtl="0" eaLnBrk="1" latinLnBrk="0" hangingPunct="1">
+      <a:lvl1pPr marL="0" algn="l" defTabSz="457200" rtl="0" eaLnBrk="1" latinLnBrk="0" hangingPunct="1">
         <a:defRPr sz="1800" kern="1200">
           <a:solidFill>
             <a:schemeClr val="tx1"/>
@@ -2999,7 +5341,7 @@
           <a:cs typeface="+mn-cs"/>
         </a:defRPr>
       </a:lvl1pPr>
-      <a:lvl2pPr marL="457200" algn="l" defTabSz="914400" rtl="0" eaLnBrk="1" latinLnBrk="0" hangingPunct="1">
+      <a:lvl2pPr marL="457200" algn="l" defTabSz="457200" rtl="0" eaLnBrk="1" latinLnBrk="0" hangingPunct="1">
         <a:defRPr sz="1800" kern="1200">
           <a:solidFill>
             <a:schemeClr val="tx1"/>
@@ -3009,7 +5351,7 @@
           <a:cs typeface="+mn-cs"/>
         </a:defRPr>
       </a:lvl2pPr>
-      <a:lvl3pPr marL="914400" algn="l" defTabSz="914400" rtl="0" eaLnBrk="1" latinLnBrk="0" hangingPunct="1">
+      <a:lvl3pPr marL="914400" algn="l" defTabSz="457200" rtl="0" eaLnBrk="1" latinLnBrk="0" hangingPunct="1">
         <a:defRPr sz="1800" kern="1200">
           <a:solidFill>
             <a:schemeClr val="tx1"/>
@@ -3019,7 +5361,7 @@
           <a:cs typeface="+mn-cs"/>
         </a:defRPr>
       </a:lvl3pPr>
-      <a:lvl4pPr marL="1371600" algn="l" defTabSz="914400" rtl="0" eaLnBrk="1" latinLnBrk="0" hangingPunct="1">
+      <a:lvl4pPr marL="1371600" algn="l" defTabSz="457200" rtl="0" eaLnBrk="1" latinLnBrk="0" hangingPunct="1">
         <a:defRPr sz="1800" kern="1200">
           <a:solidFill>
             <a:schemeClr val="tx1"/>
@@ -3029,7 +5371,7 @@
           <a:cs typeface="+mn-cs"/>
         </a:defRPr>
       </a:lvl4pPr>
-      <a:lvl5pPr marL="1828800" algn="l" defTabSz="914400" rtl="0" eaLnBrk="1" latinLnBrk="0" hangingPunct="1">
+      <a:lvl5pPr marL="1828800" algn="l" defTabSz="457200" rtl="0" eaLnBrk="1" latinLnBrk="0" hangingPunct="1">
         <a:defRPr sz="1800" kern="1200">
           <a:solidFill>
             <a:schemeClr val="tx1"/>
@@ -3039,7 +5381,7 @@
           <a:cs typeface="+mn-cs"/>
         </a:defRPr>
       </a:lvl5pPr>
-      <a:lvl6pPr marL="2286000" algn="l" defTabSz="914400" rtl="0" eaLnBrk="1" latinLnBrk="0" hangingPunct="1">
+      <a:lvl6pPr marL="2286000" algn="l" defTabSz="457200" rtl="0" eaLnBrk="1" latinLnBrk="0" hangingPunct="1">
         <a:defRPr sz="1800" kern="1200">
           <a:solidFill>
             <a:schemeClr val="tx1"/>
@@ -3049,7 +5391,7 @@
           <a:cs typeface="+mn-cs"/>
         </a:defRPr>
       </a:lvl6pPr>
-      <a:lvl7pPr marL="2743200" algn="l" defTabSz="914400" rtl="0" eaLnBrk="1" latinLnBrk="0" hangingPunct="1">
+      <a:lvl7pPr marL="2743200" algn="l" defTabSz="457200" rtl="0" eaLnBrk="1" latinLnBrk="0" hangingPunct="1">
         <a:defRPr sz="1800" kern="1200">
           <a:solidFill>
             <a:schemeClr val="tx1"/>
@@ -3059,7 +5401,7 @@
           <a:cs typeface="+mn-cs"/>
         </a:defRPr>
       </a:lvl7pPr>
-      <a:lvl8pPr marL="3200400" algn="l" defTabSz="914400" rtl="0" eaLnBrk="1" latinLnBrk="0" hangingPunct="1">
+      <a:lvl8pPr marL="3200400" algn="l" defTabSz="457200" rtl="0" eaLnBrk="1" latinLnBrk="0" hangingPunct="1">
         <a:defRPr sz="1800" kern="1200">
           <a:solidFill>
             <a:schemeClr val="tx1"/>
@@ -3069,7 +5411,7 @@
           <a:cs typeface="+mn-cs"/>
         </a:defRPr>
       </a:lvl8pPr>
-      <a:lvl9pPr marL="3657600" algn="l" defTabSz="914400" rtl="0" eaLnBrk="1" latinLnBrk="0" hangingPunct="1">
+      <a:lvl9pPr marL="3657600" algn="l" defTabSz="457200" rtl="0" eaLnBrk="1" latinLnBrk="0" hangingPunct="1">
         <a:defRPr sz="1800" kern="1200">
           <a:solidFill>
             <a:schemeClr val="tx1"/>
@@ -3230,6 +5572,13 @@
   <p:clrMapOvr>
     <a:masterClrMapping/>
   </p:clrMapOvr>
+  <p:timing>
+    <p:tnLst>
+      <p:par>
+        <p:cTn id="1" dur="indefinite" restart="never" nodeType="tmRoot"/>
+      </p:par>
+    </p:tnLst>
+  </p:timing>
 </p:sld>
 </file>
 
@@ -3336,6 +5685,13 @@
   <p:clrMapOvr>
     <a:masterClrMapping/>
   </p:clrMapOvr>
+  <p:timing>
+    <p:tnLst>
+      <p:par>
+        <p:cTn id="1" dur="indefinite" restart="never" nodeType="tmRoot"/>
+      </p:par>
+    </p:tnLst>
+  </p:timing>
 </p:sld>
 </file>
 
@@ -3402,8 +5758,9 @@
           <a:p>
             <a:r>
               <a:rPr lang="en-US" dirty="0" smtClean="0"/>
-              <a:t>A fun challenge</a:t>
-            </a:r>
+              <a:t>Explore all of the possibilities of Tron AI approaches</a:t>
+            </a:r>
+            <a:endParaRPr lang="en-US" dirty="0" smtClean="0"/>
           </a:p>
           <a:p>
             <a:endParaRPr lang="en-US" dirty="0"/>
@@ -3420,6 +5777,13 @@
   <p:clrMapOvr>
     <a:masterClrMapping/>
   </p:clrMapOvr>
+  <p:timing>
+    <p:tnLst>
+      <p:par>
+        <p:cTn id="1" dur="indefinite" restart="never" nodeType="tmRoot"/>
+      </p:par>
+    </p:tnLst>
+  </p:timing>
 </p:sld>
 </file>
 
@@ -3480,19 +5844,31 @@
           <a:p>
             <a:r>
               <a:rPr lang="en-US" dirty="0" smtClean="0"/>
-              <a:t>Making a Tron AI is surprisingly difficult</a:t>
-            </a:r>
-          </a:p>
-          <a:p>
+              <a:t>Making a Tron AI is surprisingly </a:t>
+            </a:r>
             <a:r>
               <a:rPr lang="en-US" dirty="0" smtClean="0"/>
-              <a:t>There are few calculable ways to win the game</a:t>
+              <a:t>difficult </a:t>
             </a:r>
           </a:p>
           <a:p>
             <a:r>
               <a:rPr lang="en-US" dirty="0" smtClean="0"/>
-              <a:t>Outcomes are difficult to assign any kind of scoring system to</a:t>
+              <a:t>There </a:t>
+            </a:r>
+            <a:r>
+              <a:rPr lang="en-US" dirty="0" smtClean="0"/>
+              <a:t>are few calculable ways to win the game</a:t>
+            </a:r>
+          </a:p>
+          <a:p>
+            <a:r>
+              <a:rPr lang="en-US" dirty="0" smtClean="0"/>
+              <a:t>Outcomes are difficult to assign any kind of scoring system </a:t>
+            </a:r>
+            <a:r>
+              <a:rPr lang="en-US" dirty="0" smtClean="0"/>
+              <a:t>to</a:t>
             </a:r>
             <a:endParaRPr lang="en-US" dirty="0"/>
           </a:p>
@@ -3508,6 +5884,13 @@
   <p:clrMapOvr>
     <a:masterClrMapping/>
   </p:clrMapOvr>
+  <p:timing>
+    <p:tnLst>
+      <p:par>
+        <p:cTn id="1" dur="indefinite" restart="never" nodeType="tmRoot"/>
+      </p:par>
+    </p:tnLst>
+  </p:timing>
 </p:sld>
 </file>
 
@@ -3596,6 +5979,13 @@
   <p:clrMapOvr>
     <a:masterClrMapping/>
   </p:clrMapOvr>
+  <p:timing>
+    <p:tnLst>
+      <p:par>
+        <p:cTn id="1" dur="indefinite" restart="never" nodeType="tmRoot"/>
+      </p:par>
+    </p:tnLst>
+  </p:timing>
 </p:sld>
 </file>
 
@@ -3649,7 +6039,12 @@
             <p:ph idx="1"/>
           </p:nvPr>
         </p:nvSpPr>
-        <p:spPr/>
+        <p:spPr>
+          <a:xfrm>
+            <a:off x="809997" y="2222286"/>
+            <a:ext cx="7524003" cy="4178514"/>
+          </a:xfrm>
+        </p:spPr>
         <p:txBody>
           <a:bodyPr>
             <a:normAutofit fontScale="92500" lnSpcReduction="20000"/>
@@ -3667,6 +6062,14 @@
             <a:endParaRPr lang="en-US" dirty="0" smtClean="0"/>
           </a:p>
           <a:p>
+            <a:pPr lvl="1"/>
+            <a:r>
+              <a:rPr lang="en-US" dirty="0" smtClean="0"/>
+              <a:t>Tron game that allows for AI Module plugins.</a:t>
+            </a:r>
+            <a:endParaRPr lang="en-US" dirty="0" smtClean="0"/>
+          </a:p>
+          <a:p>
             <a:r>
               <a:rPr lang="en-US" dirty="0" smtClean="0"/>
               <a:t>AI built in JavaScript</a:t>
@@ -3681,21 +6084,36 @@
           <a:p>
             <a:r>
               <a:rPr lang="en-US" dirty="0" smtClean="0"/>
-              <a:t>Master AI to control decision-making</a:t>
-            </a:r>
-          </a:p>
-          <a:p>
+              <a:t>Master AI to control </a:t>
+            </a:r>
             <a:r>
               <a:rPr lang="en-US" dirty="0" smtClean="0"/>
-              <a:t>3 states</a:t>
-            </a:r>
+              <a:t>decision-making based on heuristics from states</a:t>
+            </a:r>
+            <a:endParaRPr lang="en-US" dirty="0" smtClean="0"/>
+          </a:p>
+          <a:p>
+            <a:r>
+              <a:rPr lang="en-US" dirty="0" smtClean="0"/>
+              <a:t>3 </a:t>
+            </a:r>
+            <a:r>
+              <a:rPr lang="en-US" dirty="0" smtClean="0"/>
+              <a:t>states</a:t>
+            </a:r>
+            <a:endParaRPr lang="en-US" dirty="0" smtClean="0"/>
           </a:p>
           <a:p>
             <a:pPr lvl="1"/>
             <a:r>
               <a:rPr lang="en-US" dirty="0" smtClean="0"/>
-              <a:t>Chase: tracks down player and mimics movements</a:t>
-            </a:r>
+              <a:t>Chase: tracks down player and mimics </a:t>
+            </a:r>
+            <a:r>
+              <a:rPr lang="en-US" dirty="0" smtClean="0"/>
+              <a:t>movements, wait for an opportunity to cut off the player</a:t>
+            </a:r>
+            <a:endParaRPr lang="en-US" dirty="0" smtClean="0"/>
           </a:p>
           <a:p>
             <a:pPr lvl="1"/>
@@ -3741,6 +6159,13 @@
   <p:clrMapOvr>
     <a:masterClrMapping/>
   </p:clrMapOvr>
+  <p:timing>
+    <p:tnLst>
+      <p:par>
+        <p:cTn id="1" dur="indefinite" restart="never" nodeType="tmRoot"/>
+      </p:par>
+    </p:tnLst>
+  </p:timing>
 </p:sld>
 </file>
 
@@ -3776,9 +6201,84 @@
           <a:bodyPr/>
           <a:lstStyle/>
           <a:p>
-            <a:r>
-              <a:rPr lang="en-US" dirty="0" err="1" smtClean="0"/>
-              <a:t>Exaluation</a:t>
+            <a:endParaRPr lang="en-US" dirty="0"/>
+          </a:p>
+        </p:txBody>
+      </p:sp>
+      <p:sp>
+        <p:nvSpPr>
+          <p:cNvPr id="3" name="Content Placeholder 2"/>
+          <p:cNvSpPr>
+            <a:spLocks noGrp="1"/>
+          </p:cNvSpPr>
+          <p:nvPr>
+            <p:ph idx="1"/>
+          </p:nvPr>
+        </p:nvSpPr>
+        <p:spPr/>
+        <p:txBody>
+          <a:bodyPr/>
+          <a:lstStyle/>
+          <a:p>
+            <a:endParaRPr lang="en-US"/>
+          </a:p>
+        </p:txBody>
+      </p:sp>
+    </p:spTree>
+    <p:extLst>
+      <p:ext uri="{BB962C8B-B14F-4D97-AF65-F5344CB8AC3E}">
+        <p14:creationId xmlns:p14="http://schemas.microsoft.com/office/powerpoint/2010/main" val="3472138446"/>
+      </p:ext>
+    </p:extLst>
+  </p:cSld>
+  <p:clrMapOvr>
+    <a:masterClrMapping/>
+  </p:clrMapOvr>
+  <p:timing>
+    <p:tnLst>
+      <p:par>
+        <p:cTn id="1" dur="indefinite" restart="never" nodeType="tmRoot"/>
+      </p:par>
+    </p:tnLst>
+  </p:timing>
+</p:sld>
+</file>
+
+<file path=ppt/slides/slide8.xml><?xml version="1.0" encoding="utf-8"?>
+<p:sld xmlns:a="http://schemas.openxmlformats.org/drawingml/2006/main" xmlns:r="http://schemas.openxmlformats.org/officeDocument/2006/relationships" xmlns:p="http://schemas.openxmlformats.org/presentationml/2006/main">
+  <p:cSld>
+    <p:spTree>
+      <p:nvGrpSpPr>
+        <p:cNvPr id="1" name=""/>
+        <p:cNvGrpSpPr/>
+        <p:nvPr/>
+      </p:nvGrpSpPr>
+      <p:grpSpPr>
+        <a:xfrm>
+          <a:off x="0" y="0"/>
+          <a:ext cx="0" cy="0"/>
+          <a:chOff x="0" y="0"/>
+          <a:chExt cx="0" cy="0"/>
+        </a:xfrm>
+      </p:grpSpPr>
+      <p:sp>
+        <p:nvSpPr>
+          <p:cNvPr id="2" name="Title 1"/>
+          <p:cNvSpPr>
+            <a:spLocks noGrp="1"/>
+          </p:cNvSpPr>
+          <p:nvPr>
+            <p:ph type="title"/>
+          </p:nvPr>
+        </p:nvSpPr>
+        <p:spPr/>
+        <p:txBody>
+          <a:bodyPr/>
+          <a:lstStyle/>
+          <a:p>
+            <a:r>
+              <a:rPr lang="en-US" dirty="0" smtClean="0"/>
+              <a:t>Evaluation</a:t>
             </a:r>
             <a:endParaRPr lang="en-US" dirty="0"/>
           </a:p>
@@ -3813,13 +6313,20 @@
   <p:clrMapOvr>
     <a:masterClrMapping/>
   </p:clrMapOvr>
+  <p:timing>
+    <p:tnLst>
+      <p:par>
+        <p:cTn id="1" dur="indefinite" restart="never" nodeType="tmRoot"/>
+      </p:par>
+    </p:tnLst>
+  </p:timing>
 </p:sld>
 </file>
 
 <file path=ppt/theme/theme1.xml><?xml version="1.0" encoding="utf-8"?>
-<a:theme xmlns:a="http://schemas.openxmlformats.org/drawingml/2006/main" name="Office Theme">
+<a:theme xmlns:a="http://schemas.openxmlformats.org/drawingml/2006/main" name="Quotable">
   <a:themeElements>
-    <a:clrScheme name="Office">
+    <a:clrScheme name="Quotable">
       <a:dk1>
         <a:sysClr val="windowText" lastClr="000000"/>
       </a:dk1>
@@ -3827,83 +6334,48 @@
         <a:sysClr val="window" lastClr="FFFFFF"/>
       </a:lt1>
       <a:dk2>
-        <a:srgbClr val="1F497D"/>
+        <a:srgbClr val="212121"/>
       </a:dk2>
       <a:lt2>
-        <a:srgbClr val="EEECE1"/>
+        <a:srgbClr val="636363"/>
       </a:lt2>
       <a:accent1>
-        <a:srgbClr val="4F81BD"/>
+        <a:srgbClr val="00C6BB"/>
       </a:accent1>
       <a:accent2>
-        <a:srgbClr val="C0504D"/>
+        <a:srgbClr val="6FEBA0"/>
       </a:accent2>
       <a:accent3>
-        <a:srgbClr val="9BBB59"/>
+        <a:srgbClr val="B6DF5E"/>
       </a:accent3>
       <a:accent4>
-        <a:srgbClr val="8064A2"/>
+        <a:srgbClr val="EFB251"/>
       </a:accent4>
       <a:accent5>
-        <a:srgbClr val="4BACC6"/>
+        <a:srgbClr val="EF755F"/>
       </a:accent5>
       <a:accent6>
-        <a:srgbClr val="F79646"/>
+        <a:srgbClr val="ED515C"/>
       </a:accent6>
       <a:hlink>
-        <a:srgbClr val="0000FF"/>
+        <a:srgbClr val="8F8F8F"/>
       </a:hlink>
       <a:folHlink>
-        <a:srgbClr val="800080"/>
+        <a:srgbClr val="A5A5A5"/>
       </a:folHlink>
     </a:clrScheme>
-    <a:fontScheme name="Office">
+    <a:fontScheme name="Quotable">
       <a:majorFont>
-        <a:latin typeface="Calibri"/>
+        <a:latin typeface="Century Gothic" panose="020B0502020202020204"/>
         <a:ea typeface=""/>
         <a:cs typeface=""/>
-        <a:font script="Jpan" typeface="ＭＳ Ｐゴシック"/>
+        <a:font script="Jpan" typeface="ＭＳ ゴシック"/>
         <a:font script="Hang" typeface="맑은 고딕"/>
         <a:font script="Hans" typeface="宋体"/>
         <a:font script="Hant" typeface="新細明體"/>
-        <a:font script="Arab" typeface="Times New Roman"/>
-        <a:font script="Hebr" typeface="Times New Roman"/>
-        <a:font script="Thai" typeface="Angsana New"/>
-        <a:font script="Ethi" typeface="Nyala"/>
-        <a:font script="Beng" typeface="Vrinda"/>
-        <a:font script="Gujr" typeface="Shruti"/>
-        <a:font script="Khmr" typeface="MoolBoran"/>
-        <a:font script="Knda" typeface="Tunga"/>
-        <a:font script="Guru" typeface="Raavi"/>
-        <a:font script="Cans" typeface="Euphemia"/>
-        <a:font script="Cher" typeface="Plantagenet Cherokee"/>
-        <a:font script="Yiii" typeface="Microsoft Yi Baiti"/>
-        <a:font script="Tibt" typeface="Microsoft Himalaya"/>
-        <a:font script="Thaa" typeface="MV Boli"/>
-        <a:font script="Deva" typeface="Mangal"/>
-        <a:font script="Telu" typeface="Gautami"/>
-        <a:font script="Taml" typeface="Latha"/>
-        <a:font script="Syrc" typeface="Estrangelo Edessa"/>
-        <a:font script="Orya" typeface="Kalinga"/>
-        <a:font script="Mlym" typeface="Kartika"/>
-        <a:font script="Laoo" typeface="DokChampa"/>
-        <a:font script="Sinh" typeface="Iskoola Pota"/>
-        <a:font script="Mong" typeface="Mongolian Baiti"/>
-        <a:font script="Viet" typeface="Times New Roman"/>
-        <a:font script="Uigh" typeface="Microsoft Uighur"/>
-        <a:font script="Geor" typeface="Sylfaen"/>
-      </a:majorFont>
-      <a:minorFont>
-        <a:latin typeface="Calibri"/>
-        <a:ea typeface=""/>
-        <a:cs typeface=""/>
-        <a:font script="Jpan" typeface="ＭＳ Ｐゴシック"/>
-        <a:font script="Hang" typeface="맑은 고딕"/>
-        <a:font script="Hans" typeface="宋体"/>
-        <a:font script="Hant" typeface="新細明體"/>
-        <a:font script="Arab" typeface="Arial"/>
-        <a:font script="Hebr" typeface="Arial"/>
-        <a:font script="Thai" typeface="Cordia New"/>
+        <a:font script="Arab" typeface="Tahoma"/>
+        <a:font script="Hebr" typeface="Gisha"/>
+        <a:font script="Thai" typeface="DilleniaUPC"/>
         <a:font script="Ethi" typeface="Nyala"/>
         <a:font script="Beng" typeface="Vrinda"/>
         <a:font script="Gujr" typeface="Shruti"/>
@@ -3924,12 +6396,47 @@
         <a:font script="Laoo" typeface="DokChampa"/>
         <a:font script="Sinh" typeface="Iskoola Pota"/>
         <a:font script="Mong" typeface="Mongolian Baiti"/>
-        <a:font script="Viet" typeface="Arial"/>
+        <a:font script="Viet" typeface="Tahoma"/>
+        <a:font script="Uigh" typeface="Microsoft Uighur"/>
+        <a:font script="Geor" typeface="Sylfaen"/>
+      </a:majorFont>
+      <a:minorFont>
+        <a:latin typeface="Century Gothic" panose="020B0502020202020204"/>
+        <a:ea typeface=""/>
+        <a:cs typeface=""/>
+        <a:font script="Jpan" typeface="ＭＳ ゴシック"/>
+        <a:font script="Hang" typeface="맑은 고딕"/>
+        <a:font script="Hans" typeface="宋体"/>
+        <a:font script="Hant" typeface="新細明體"/>
+        <a:font script="Arab" typeface="Tahoma"/>
+        <a:font script="Hebr" typeface="Gisha"/>
+        <a:font script="Thai" typeface="DilleniaUPC"/>
+        <a:font script="Ethi" typeface="Nyala"/>
+        <a:font script="Beng" typeface="Vrinda"/>
+        <a:font script="Gujr" typeface="Shruti"/>
+        <a:font script="Khmr" typeface="DaunPenh"/>
+        <a:font script="Knda" typeface="Tunga"/>
+        <a:font script="Guru" typeface="Raavi"/>
+        <a:font script="Cans" typeface="Euphemia"/>
+        <a:font script="Cher" typeface="Plantagenet Cherokee"/>
+        <a:font script="Yiii" typeface="Microsoft Yi Baiti"/>
+        <a:font script="Tibt" typeface="Microsoft Himalaya"/>
+        <a:font script="Thaa" typeface="MV Boli"/>
+        <a:font script="Deva" typeface="Mangal"/>
+        <a:font script="Telu" typeface="Gautami"/>
+        <a:font script="Taml" typeface="Latha"/>
+        <a:font script="Syrc" typeface="Estrangelo Edessa"/>
+        <a:font script="Orya" typeface="Kalinga"/>
+        <a:font script="Mlym" typeface="Kartika"/>
+        <a:font script="Laoo" typeface="DokChampa"/>
+        <a:font script="Sinh" typeface="Iskoola Pota"/>
+        <a:font script="Mong" typeface="Mongolian Baiti"/>
+        <a:font script="Viet" typeface="Verdana"/>
         <a:font script="Uigh" typeface="Microsoft Uighur"/>
         <a:font script="Geor" typeface="Sylfaen"/>
       </a:minorFont>
     </a:fontScheme>
-    <a:fmtScheme name="Office">
+    <a:fmtScheme name="Quotable">
       <a:fillStyleLst>
         <a:solidFill>
           <a:schemeClr val="phClr"/>
@@ -3938,66 +6445,48 @@
           <a:gsLst>
             <a:gs pos="0">
               <a:schemeClr val="phClr">
-                <a:tint val="50000"/>
-                <a:satMod val="300000"/>
-              </a:schemeClr>
-            </a:gs>
-            <a:gs pos="35000">
-              <a:schemeClr val="phClr">
-                <a:tint val="37000"/>
-                <a:satMod val="300000"/>
+                <a:tint val="80000"/>
+                <a:lumMod val="105000"/>
               </a:schemeClr>
             </a:gs>
             <a:gs pos="100000">
               <a:schemeClr val="phClr">
-                <a:tint val="15000"/>
-                <a:satMod val="350000"/>
+                <a:tint val="90000"/>
               </a:schemeClr>
             </a:gs>
           </a:gsLst>
-          <a:lin ang="16200000" scaled="1"/>
+          <a:lin ang="5400000" scaled="0"/>
         </a:gradFill>
-        <a:gradFill rotWithShape="1">
-          <a:gsLst>
-            <a:gs pos="0">
+        <a:blipFill rotWithShape="1">
+          <a:blip xmlns:r="http://schemas.openxmlformats.org/officeDocument/2006/relationships" r:embed="rId1">
+            <a:duotone>
               <a:schemeClr val="phClr">
-                <a:shade val="51000"/>
-                <a:satMod val="130000"/>
+                <a:tint val="98000"/>
+                <a:lumMod val="102000"/>
               </a:schemeClr>
-            </a:gs>
-            <a:gs pos="80000">
               <a:schemeClr val="phClr">
-                <a:shade val="93000"/>
-                <a:satMod val="130000"/>
+                <a:shade val="98000"/>
+                <a:lumMod val="98000"/>
               </a:schemeClr>
-            </a:gs>
-            <a:gs pos="100000">
-              <a:schemeClr val="phClr">
-                <a:shade val="94000"/>
-                <a:satMod val="135000"/>
-              </a:schemeClr>
-            </a:gs>
-          </a:gsLst>
-          <a:lin ang="16200000" scaled="0"/>
-        </a:gradFill>
+            </a:duotone>
+          </a:blip>
+          <a:tile tx="0" ty="0" sx="100000" sy="100000" flip="none" algn="tl"/>
+        </a:blipFill>
       </a:fillStyleLst>
       <a:lnStyleLst>
-        <a:ln w="9525" cap="flat" cmpd="sng" algn="ctr">
-          <a:solidFill>
-            <a:schemeClr val="phClr">
-              <a:shade val="95000"/>
-              <a:satMod val="105000"/>
-            </a:schemeClr>
-          </a:solidFill>
-          <a:prstDash val="solid"/>
-        </a:ln>
-        <a:ln w="25400" cap="flat" cmpd="sng" algn="ctr">
+        <a:ln w="9525" cap="rnd" cmpd="sng" algn="ctr">
           <a:solidFill>
             <a:schemeClr val="phClr"/>
           </a:solidFill>
           <a:prstDash val="solid"/>
         </a:ln>
-        <a:ln w="38100" cap="flat" cmpd="sng" algn="ctr">
+        <a:ln w="15875" cap="rnd" cmpd="sng" algn="ctr">
+          <a:solidFill>
+            <a:schemeClr val="phClr"/>
+          </a:solidFill>
+          <a:prstDash val="solid"/>
+        </a:ln>
+        <a:ln w="25400" cap="rnd" cmpd="sng" algn="ctr">
           <a:solidFill>
             <a:schemeClr val="phClr"/>
           </a:solidFill>
@@ -4006,42 +6495,19 @@
       </a:lnStyleLst>
       <a:effectStyleLst>
         <a:effectStyle>
-          <a:effectLst>
-            <a:outerShdw blurRad="40000" dist="20000" dir="5400000" rotWithShape="0">
-              <a:srgbClr val="000000">
-                <a:alpha val="38000"/>
-              </a:srgbClr>
-            </a:outerShdw>
-          </a:effectLst>
+          <a:effectLst/>
+        </a:effectStyle>
+        <a:effectStyle>
+          <a:effectLst/>
         </a:effectStyle>
         <a:effectStyle>
           <a:effectLst>
-            <a:outerShdw blurRad="40000" dist="23000" dir="5400000" rotWithShape="0">
+            <a:innerShdw blurRad="63500" dist="25400" dir="13500000">
               <a:srgbClr val="000000">
-                <a:alpha val="35000"/>
+                <a:alpha val="75000"/>
               </a:srgbClr>
-            </a:outerShdw>
+            </a:innerShdw>
           </a:effectLst>
-        </a:effectStyle>
-        <a:effectStyle>
-          <a:effectLst>
-            <a:outerShdw blurRad="40000" dist="23000" dir="5400000" rotWithShape="0">
-              <a:srgbClr val="000000">
-                <a:alpha val="35000"/>
-              </a:srgbClr>
-            </a:outerShdw>
-          </a:effectLst>
-          <a:scene3d>
-            <a:camera prst="orthographicFront">
-              <a:rot lat="0" lon="0" rev="0"/>
-            </a:camera>
-            <a:lightRig rig="threePt" dir="t">
-              <a:rot lat="0" lon="0" rev="1200000"/>
-            </a:lightRig>
-          </a:scene3d>
-          <a:sp3d>
-            <a:bevelT w="63500" h="25400"/>
-          </a:sp3d>
         </a:effectStyle>
       </a:effectStyleLst>
       <a:bgFillStyleLst>
@@ -4052,51 +6518,44 @@
           <a:gsLst>
             <a:gs pos="0">
               <a:schemeClr val="phClr">
-                <a:tint val="40000"/>
-                <a:satMod val="350000"/>
-              </a:schemeClr>
-            </a:gs>
-            <a:gs pos="40000">
-              <a:schemeClr val="phClr">
-                <a:tint val="45000"/>
-                <a:shade val="99000"/>
-                <a:satMod val="350000"/>
+                <a:tint val="100000"/>
               </a:schemeClr>
             </a:gs>
             <a:gs pos="100000">
               <a:schemeClr val="phClr">
-                <a:shade val="20000"/>
-                <a:satMod val="255000"/>
+                <a:tint val="84000"/>
+                <a:shade val="84000"/>
+                <a:lumMod val="90000"/>
               </a:schemeClr>
             </a:gs>
           </a:gsLst>
-          <a:path path="circle">
-            <a:fillToRect l="50000" t="-80000" r="50000" b="180000"/>
-          </a:path>
+          <a:lin ang="5400000" scaled="0"/>
         </a:gradFill>
         <a:gradFill rotWithShape="1">
           <a:gsLst>
             <a:gs pos="0">
               <a:schemeClr val="phClr">
-                <a:tint val="80000"/>
-                <a:satMod val="300000"/>
+                <a:tint val="84000"/>
+                <a:shade val="90000"/>
+                <a:satMod val="120000"/>
+                <a:lumMod val="90000"/>
               </a:schemeClr>
             </a:gs>
             <a:gs pos="100000">
-              <a:schemeClr val="phClr">
-                <a:shade val="30000"/>
-                <a:satMod val="200000"/>
-              </a:schemeClr>
+              <a:schemeClr val="phClr"/>
             </a:gs>
           </a:gsLst>
-          <a:path path="circle">
-            <a:fillToRect l="50000" t="50000" r="50000" b="50000"/>
-          </a:path>
+          <a:lin ang="5400000" scaled="0"/>
         </a:gradFill>
       </a:bgFillStyleLst>
     </a:fmtScheme>
   </a:themeElements>
   <a:objectDefaults/>
   <a:extraClrSchemeLst/>
+  <a:extLst>
+    <a:ext uri="{05A4C25C-085E-4340-85A3-A5531E510DB2}">
+      <thm15:themeFamily xmlns:thm15="http://schemas.microsoft.com/office/thememl/2012/main" name="Quotable" id="{39EC5628-30ED-4578-ACD8-9820EDB8E15A}" vid="{6F3559E9-1A4C-49D8-94D4-F41003531C49}"/>
+    </a:ext>
+  </a:extLst>
 </a:theme>
 </file>
</xml_diff>